<commit_message>
added new pictures and edited final presentation
</commit_message>
<xml_diff>
--- a/documents/presentation/TallyFinal.pptx
+++ b/documents/presentation/TallyFinal.pptx
@@ -5,15 +5,23 @@
     <p:sldMasterId id="2147483648" r:id="rId1"/>
   </p:sldMasterIdLst>
   <p:notesMasterIdLst>
-    <p:notesMasterId r:id="rId5"/>
+    <p:notesMasterId r:id="rId13"/>
   </p:notesMasterIdLst>
   <p:handoutMasterIdLst>
-    <p:handoutMasterId r:id="rId6"/>
+    <p:handoutMasterId r:id="rId14"/>
   </p:handoutMasterIdLst>
   <p:sldIdLst>
     <p:sldId id="256" r:id="rId2"/>
     <p:sldId id="257" r:id="rId3"/>
     <p:sldId id="258" r:id="rId4"/>
+    <p:sldId id="259" r:id="rId5"/>
+    <p:sldId id="260" r:id="rId6"/>
+    <p:sldId id="261" r:id="rId7"/>
+    <p:sldId id="262" r:id="rId8"/>
+    <p:sldId id="263" r:id="rId9"/>
+    <p:sldId id="264" r:id="rId10"/>
+    <p:sldId id="265" r:id="rId11"/>
+    <p:sldId id="266" r:id="rId12"/>
   </p:sldIdLst>
   <p:sldSz cx="9144000" cy="6858000" type="screen4x3"/>
   <p:notesSz cx="6858000" cy="9144000"/>
@@ -210,14 +218,14 @@
           </a:ln>
           <a:extLst>
             <a:ext uri="{909E8E84-426E-40dd-AFC4-6F175D3DCCD1}">
-              <a14:hiddenFill xmlns:a14="http://schemas.microsoft.com/office/drawing/2010/main" xmlns="">
+              <a14:hiddenFill xmlns="" xmlns:a14="http://schemas.microsoft.com/office/drawing/2010/main">
                 <a:solidFill>
                   <a:schemeClr val="accent1"/>
                 </a:solidFill>
               </a14:hiddenFill>
             </a:ext>
             <a:ext uri="{91240B29-F687-4f45-9708-019B960494DF}">
-              <a14:hiddenLine xmlns:a14="http://schemas.microsoft.com/office/drawing/2010/main" xmlns="" w="9525">
+              <a14:hiddenLine xmlns="" xmlns:a14="http://schemas.microsoft.com/office/drawing/2010/main" w="9525">
                 <a:solidFill>
                   <a:schemeClr val="tx1"/>
                 </a:solidFill>
@@ -227,7 +235,7 @@
               </a14:hiddenLine>
             </a:ext>
             <a:ext uri="{FAA26D3D-D897-4be2-8F04-BA451C77F1D7}">
-              <ma14:placeholderFlag xmlns:ma14="http://schemas.microsoft.com/office/mac/drawingml/2011/main" xmlns="" val="1"/>
+              <ma14:placeholderFlag xmlns="" xmlns:ma14="http://schemas.microsoft.com/office/mac/drawingml/2011/main" val="1"/>
             </a:ext>
           </a:extLst>
         </p:spPr>
@@ -271,14 +279,14 @@
           </a:ln>
           <a:extLst>
             <a:ext uri="{909E8E84-426E-40dd-AFC4-6F175D3DCCD1}">
-              <a14:hiddenFill xmlns:a14="http://schemas.microsoft.com/office/drawing/2010/main" xmlns="">
+              <a14:hiddenFill xmlns="" xmlns:a14="http://schemas.microsoft.com/office/drawing/2010/main">
                 <a:solidFill>
                   <a:schemeClr val="accent1"/>
                 </a:solidFill>
               </a14:hiddenFill>
             </a:ext>
             <a:ext uri="{91240B29-F687-4f45-9708-019B960494DF}">
-              <a14:hiddenLine xmlns:a14="http://schemas.microsoft.com/office/drawing/2010/main" xmlns="" w="9525">
+              <a14:hiddenLine xmlns="" xmlns:a14="http://schemas.microsoft.com/office/drawing/2010/main" w="9525">
                 <a:solidFill>
                   <a:schemeClr val="tx1"/>
                 </a:solidFill>
@@ -288,7 +296,7 @@
               </a14:hiddenLine>
             </a:ext>
             <a:ext uri="{FAA26D3D-D897-4be2-8F04-BA451C77F1D7}">
-              <ma14:placeholderFlag xmlns:ma14="http://schemas.microsoft.com/office/mac/drawingml/2011/main" xmlns="" val="1"/>
+              <ma14:placeholderFlag xmlns="" xmlns:ma14="http://schemas.microsoft.com/office/mac/drawingml/2011/main" val="1"/>
             </a:ext>
           </a:extLst>
         </p:spPr>
@@ -332,14 +340,14 @@
           </a:ln>
           <a:extLst>
             <a:ext uri="{909E8E84-426E-40dd-AFC4-6F175D3DCCD1}">
-              <a14:hiddenFill xmlns:a14="http://schemas.microsoft.com/office/drawing/2010/main" xmlns="">
+              <a14:hiddenFill xmlns="" xmlns:a14="http://schemas.microsoft.com/office/drawing/2010/main">
                 <a:solidFill>
                   <a:schemeClr val="accent1"/>
                 </a:solidFill>
               </a14:hiddenFill>
             </a:ext>
             <a:ext uri="{91240B29-F687-4f45-9708-019B960494DF}">
-              <a14:hiddenLine xmlns:a14="http://schemas.microsoft.com/office/drawing/2010/main" xmlns="" w="9525">
+              <a14:hiddenLine xmlns="" xmlns:a14="http://schemas.microsoft.com/office/drawing/2010/main" w="9525">
                 <a:solidFill>
                   <a:schemeClr val="tx1"/>
                 </a:solidFill>
@@ -349,7 +357,7 @@
               </a14:hiddenLine>
             </a:ext>
             <a:ext uri="{FAA26D3D-D897-4be2-8F04-BA451C77F1D7}">
-              <ma14:placeholderFlag xmlns:ma14="http://schemas.microsoft.com/office/mac/drawingml/2011/main" xmlns="" val="1"/>
+              <ma14:placeholderFlag xmlns="" xmlns:ma14="http://schemas.microsoft.com/office/mac/drawingml/2011/main" val="1"/>
             </a:ext>
           </a:extLst>
         </p:spPr>
@@ -393,14 +401,14 @@
           </a:ln>
           <a:extLst>
             <a:ext uri="{909E8E84-426E-40dd-AFC4-6F175D3DCCD1}">
-              <a14:hiddenFill xmlns:a14="http://schemas.microsoft.com/office/drawing/2010/main" xmlns="">
+              <a14:hiddenFill xmlns="" xmlns:a14="http://schemas.microsoft.com/office/drawing/2010/main">
                 <a:solidFill>
                   <a:schemeClr val="accent1"/>
                 </a:solidFill>
               </a14:hiddenFill>
             </a:ext>
             <a:ext uri="{91240B29-F687-4f45-9708-019B960494DF}">
-              <a14:hiddenLine xmlns:a14="http://schemas.microsoft.com/office/drawing/2010/main" xmlns="" w="9525">
+              <a14:hiddenLine xmlns="" xmlns:a14="http://schemas.microsoft.com/office/drawing/2010/main" w="9525">
                 <a:solidFill>
                   <a:schemeClr val="tx1"/>
                 </a:solidFill>
@@ -410,7 +418,7 @@
               </a14:hiddenLine>
             </a:ext>
             <a:ext uri="{FAA26D3D-D897-4be2-8F04-BA451C77F1D7}">
-              <ma14:placeholderFlag xmlns:ma14="http://schemas.microsoft.com/office/mac/drawingml/2011/main" xmlns="" val="1"/>
+              <ma14:placeholderFlag xmlns="" xmlns:ma14="http://schemas.microsoft.com/office/mac/drawingml/2011/main" val="1"/>
             </a:ext>
           </a:extLst>
         </p:spPr>
@@ -495,14 +503,14 @@
           </a:ln>
           <a:extLst>
             <a:ext uri="{909E8E84-426E-40dd-AFC4-6F175D3DCCD1}">
-              <a14:hiddenFill xmlns:a14="http://schemas.microsoft.com/office/drawing/2010/main" xmlns="">
+              <a14:hiddenFill xmlns="" xmlns:a14="http://schemas.microsoft.com/office/drawing/2010/main">
                 <a:solidFill>
                   <a:schemeClr val="accent1"/>
                 </a:solidFill>
               </a14:hiddenFill>
             </a:ext>
             <a:ext uri="{91240B29-F687-4f45-9708-019B960494DF}">
-              <a14:hiddenLine xmlns:a14="http://schemas.microsoft.com/office/drawing/2010/main" xmlns="" w="9525">
+              <a14:hiddenLine xmlns="" xmlns:a14="http://schemas.microsoft.com/office/drawing/2010/main" w="9525">
                 <a:solidFill>
                   <a:schemeClr val="tx1"/>
                 </a:solidFill>
@@ -512,7 +520,7 @@
               </a14:hiddenLine>
             </a:ext>
             <a:ext uri="{FAA26D3D-D897-4be2-8F04-BA451C77F1D7}">
-              <ma14:placeholderFlag xmlns:ma14="http://schemas.microsoft.com/office/mac/drawingml/2011/main" xmlns="" val="1"/>
+              <ma14:placeholderFlag xmlns="" xmlns:ma14="http://schemas.microsoft.com/office/mac/drawingml/2011/main" val="1"/>
             </a:ext>
           </a:extLst>
         </p:spPr>
@@ -556,14 +564,14 @@
           </a:ln>
           <a:extLst>
             <a:ext uri="{909E8E84-426E-40dd-AFC4-6F175D3DCCD1}">
-              <a14:hiddenFill xmlns:a14="http://schemas.microsoft.com/office/drawing/2010/main" xmlns="">
+              <a14:hiddenFill xmlns="" xmlns:a14="http://schemas.microsoft.com/office/drawing/2010/main">
                 <a:solidFill>
                   <a:schemeClr val="accent1"/>
                 </a:solidFill>
               </a14:hiddenFill>
             </a:ext>
             <a:ext uri="{91240B29-F687-4f45-9708-019B960494DF}">
-              <a14:hiddenLine xmlns:a14="http://schemas.microsoft.com/office/drawing/2010/main" xmlns="" w="9525">
+              <a14:hiddenLine xmlns="" xmlns:a14="http://schemas.microsoft.com/office/drawing/2010/main" w="9525">
                 <a:solidFill>
                   <a:schemeClr val="tx1"/>
                 </a:solidFill>
@@ -573,7 +581,7 @@
               </a14:hiddenLine>
             </a:ext>
             <a:ext uri="{FAA26D3D-D897-4be2-8F04-BA451C77F1D7}">
-              <ma14:placeholderFlag xmlns:ma14="http://schemas.microsoft.com/office/mac/drawingml/2011/main" xmlns="" val="1"/>
+              <ma14:placeholderFlag xmlns="" xmlns:ma14="http://schemas.microsoft.com/office/mac/drawingml/2011/main" val="1"/>
             </a:ext>
           </a:extLst>
         </p:spPr>
@@ -623,7 +631,7 @@
           <a:effectLst/>
           <a:extLst>
             <a:ext uri="{AF507438-7753-43e0-B8FC-AC1667EBCBE1}">
-              <a14:hiddenEffects xmlns:a14="http://schemas.microsoft.com/office/drawing/2010/main" xmlns="">
+              <a14:hiddenEffects xmlns="" xmlns:a14="http://schemas.microsoft.com/office/drawing/2010/main">
                 <a:effectLst>
                   <a:outerShdw blurRad="63500" dist="38099" dir="2700000" algn="ctr" rotWithShape="0">
                     <a:srgbClr val="000000">
@@ -634,7 +642,7 @@
               </a14:hiddenEffects>
             </a:ext>
             <a:ext uri="{53640926-AAD7-44d8-BBD7-CCE9431645EC}">
-              <a14:shadowObscured xmlns:a14="http://schemas.microsoft.com/office/drawing/2010/main" xmlns="" val="1"/>
+              <a14:shadowObscured xmlns="" xmlns:a14="http://schemas.microsoft.com/office/drawing/2010/main" val="1"/>
             </a:ext>
           </a:extLst>
         </p:spPr>
@@ -663,14 +671,14 @@
           </a:ln>
           <a:extLst>
             <a:ext uri="{909E8E84-426E-40dd-AFC4-6F175D3DCCD1}">
-              <a14:hiddenFill xmlns:a14="http://schemas.microsoft.com/office/drawing/2010/main" xmlns="">
+              <a14:hiddenFill xmlns="" xmlns:a14="http://schemas.microsoft.com/office/drawing/2010/main">
                 <a:solidFill>
                   <a:schemeClr val="accent1"/>
                 </a:solidFill>
               </a14:hiddenFill>
             </a:ext>
             <a:ext uri="{91240B29-F687-4f45-9708-019B960494DF}">
-              <a14:hiddenLine xmlns:a14="http://schemas.microsoft.com/office/drawing/2010/main" xmlns="" w="9525">
+              <a14:hiddenLine xmlns="" xmlns:a14="http://schemas.microsoft.com/office/drawing/2010/main" w="9525">
                 <a:solidFill>
                   <a:schemeClr val="tx1"/>
                 </a:solidFill>
@@ -680,7 +688,7 @@
               </a14:hiddenLine>
             </a:ext>
             <a:ext uri="{FAA26D3D-D897-4be2-8F04-BA451C77F1D7}">
-              <ma14:placeholderFlag xmlns:ma14="http://schemas.microsoft.com/office/mac/drawingml/2011/main" xmlns="" val="1"/>
+              <ma14:placeholderFlag xmlns="" xmlns:ma14="http://schemas.microsoft.com/office/mac/drawingml/2011/main" val="1"/>
             </a:ext>
           </a:extLst>
         </p:spPr>
@@ -752,14 +760,14 @@
           </a:ln>
           <a:extLst>
             <a:ext uri="{909E8E84-426E-40dd-AFC4-6F175D3DCCD1}">
-              <a14:hiddenFill xmlns:a14="http://schemas.microsoft.com/office/drawing/2010/main" xmlns="">
+              <a14:hiddenFill xmlns="" xmlns:a14="http://schemas.microsoft.com/office/drawing/2010/main">
                 <a:solidFill>
                   <a:schemeClr val="accent1"/>
                 </a:solidFill>
               </a14:hiddenFill>
             </a:ext>
             <a:ext uri="{91240B29-F687-4f45-9708-019B960494DF}">
-              <a14:hiddenLine xmlns:a14="http://schemas.microsoft.com/office/drawing/2010/main" xmlns="" w="9525">
+              <a14:hiddenLine xmlns="" xmlns:a14="http://schemas.microsoft.com/office/drawing/2010/main" w="9525">
                 <a:solidFill>
                   <a:schemeClr val="tx1"/>
                 </a:solidFill>
@@ -769,7 +777,7 @@
               </a14:hiddenLine>
             </a:ext>
             <a:ext uri="{FAA26D3D-D897-4be2-8F04-BA451C77F1D7}">
-              <ma14:placeholderFlag xmlns:ma14="http://schemas.microsoft.com/office/mac/drawingml/2011/main" xmlns="" val="1"/>
+              <ma14:placeholderFlag xmlns="" xmlns:ma14="http://schemas.microsoft.com/office/mac/drawingml/2011/main" val="1"/>
             </a:ext>
           </a:extLst>
         </p:spPr>
@@ -813,14 +821,14 @@
           </a:ln>
           <a:extLst>
             <a:ext uri="{909E8E84-426E-40dd-AFC4-6F175D3DCCD1}">
-              <a14:hiddenFill xmlns:a14="http://schemas.microsoft.com/office/drawing/2010/main" xmlns="">
+              <a14:hiddenFill xmlns="" xmlns:a14="http://schemas.microsoft.com/office/drawing/2010/main">
                 <a:solidFill>
                   <a:schemeClr val="accent1"/>
                 </a:solidFill>
               </a14:hiddenFill>
             </a:ext>
             <a:ext uri="{91240B29-F687-4f45-9708-019B960494DF}">
-              <a14:hiddenLine xmlns:a14="http://schemas.microsoft.com/office/drawing/2010/main" xmlns="" w="9525">
+              <a14:hiddenLine xmlns="" xmlns:a14="http://schemas.microsoft.com/office/drawing/2010/main" w="9525">
                 <a:solidFill>
                   <a:schemeClr val="tx1"/>
                 </a:solidFill>
@@ -830,7 +838,7 @@
               </a14:hiddenLine>
             </a:ext>
             <a:ext uri="{FAA26D3D-D897-4be2-8F04-BA451C77F1D7}">
-              <ma14:placeholderFlag xmlns:ma14="http://schemas.microsoft.com/office/mac/drawingml/2011/main" xmlns="" val="1"/>
+              <ma14:placeholderFlag xmlns="" xmlns:ma14="http://schemas.microsoft.com/office/mac/drawingml/2011/main" val="1"/>
             </a:ext>
           </a:extLst>
         </p:spPr>
@@ -1045,7 +1053,7 @@
           <a:ln/>
           <a:extLst>
             <a:ext uri="{FAA26D3D-D897-4be2-8F04-BA451C77F1D7}">
-              <ma14:placeholderFlag xmlns:ma14="http://schemas.microsoft.com/office/mac/drawingml/2011/main" xmlns="" val="1"/>
+              <ma14:placeholderFlag xmlns="" xmlns:ma14="http://schemas.microsoft.com/office/mac/drawingml/2011/main" val="1"/>
             </a:ext>
           </a:extLst>
         </p:spPr>
@@ -1139,7 +1147,7 @@
           <a:ln/>
           <a:extLst>
             <a:ext uri="{FAA26D3D-D897-4be2-8F04-BA451C77F1D7}">
-              <ma14:placeholderFlag xmlns:ma14="http://schemas.microsoft.com/office/mac/drawingml/2011/main" xmlns="" val="1"/>
+              <ma14:placeholderFlag xmlns="" xmlns:ma14="http://schemas.microsoft.com/office/mac/drawingml/2011/main" val="1"/>
             </a:ext>
           </a:extLst>
         </p:spPr>
@@ -1218,7 +1226,7 @@
           <a:effectLst/>
           <a:extLst>
             <a:ext uri="{91240B29-F687-4f45-9708-019B960494DF}">
-              <a14:hiddenLine xmlns:a14="http://schemas.microsoft.com/office/drawing/2010/main" xmlns="" w="9525">
+              <a14:hiddenLine xmlns="" xmlns:a14="http://schemas.microsoft.com/office/drawing/2010/main" w="9525">
                 <a:solidFill>
                   <a:srgbClr val="0E1B44"/>
                 </a:solidFill>
@@ -1228,7 +1236,7 @@
               </a14:hiddenLine>
             </a:ext>
             <a:ext uri="{AF507438-7753-43e0-B8FC-AC1667EBCBE1}">
-              <a14:hiddenEffects xmlns:a14="http://schemas.microsoft.com/office/drawing/2010/main" xmlns="">
+              <a14:hiddenEffects xmlns="" xmlns:a14="http://schemas.microsoft.com/office/drawing/2010/main">
                 <a:effectLst>
                   <a:outerShdw blurRad="63500" dist="38099" dir="2700000" algn="ctr" rotWithShape="0">
                     <a:srgbClr val="000000">
@@ -1272,7 +1280,7 @@
           </a:ln>
           <a:extLst>
             <a:ext uri="{91240B29-F687-4f45-9708-019B960494DF}">
-              <a14:hiddenLine xmlns:a14="http://schemas.microsoft.com/office/drawing/2010/main" xmlns="" w="9525">
+              <a14:hiddenLine xmlns="" xmlns:a14="http://schemas.microsoft.com/office/drawing/2010/main" w="9525">
                 <a:solidFill>
                   <a:schemeClr val="tx1"/>
                 </a:solidFill>
@@ -1323,7 +1331,7 @@
           <a:noFill/>
           <a:extLst>
             <a:ext uri="{909E8E84-426E-40dd-AFC4-6F175D3DCCD1}">
-              <a14:hiddenFill xmlns:a14="http://schemas.microsoft.com/office/drawing/2010/main" xmlns="">
+              <a14:hiddenFill xmlns="" xmlns:a14="http://schemas.microsoft.com/office/drawing/2010/main">
                 <a:solidFill>
                   <a:srgbClr val="FFFFFF"/>
                 </a:solidFill>
@@ -1359,7 +1367,7 @@
           </a:ln>
           <a:extLst>
             <a:ext uri="{909E8E84-426E-40dd-AFC4-6F175D3DCCD1}">
-              <a14:hiddenFill xmlns:a14="http://schemas.microsoft.com/office/drawing/2010/main" xmlns="">
+              <a14:hiddenFill xmlns="" xmlns:a14="http://schemas.microsoft.com/office/drawing/2010/main">
                 <a:noFill/>
               </a14:hiddenFill>
             </a:ext>
@@ -3083,7 +3091,7 @@
           <a:effectLst/>
           <a:extLst>
             <a:ext uri="{91240B29-F687-4f45-9708-019B960494DF}">
-              <a14:hiddenLine xmlns:a14="http://schemas.microsoft.com/office/drawing/2010/main" xmlns="" w="9525">
+              <a14:hiddenLine xmlns="" xmlns:a14="http://schemas.microsoft.com/office/drawing/2010/main" w="9525">
                 <a:solidFill>
                   <a:srgbClr val="0E1B44"/>
                 </a:solidFill>
@@ -3093,7 +3101,7 @@
               </a14:hiddenLine>
             </a:ext>
             <a:ext uri="{AF507438-7753-43e0-B8FC-AC1667EBCBE1}">
-              <a14:hiddenEffects xmlns:a14="http://schemas.microsoft.com/office/drawing/2010/main" xmlns="">
+              <a14:hiddenEffects xmlns="" xmlns:a14="http://schemas.microsoft.com/office/drawing/2010/main">
                 <a:effectLst>
                   <a:outerShdw blurRad="63500" dist="38099" dir="2700000" algn="ctr" rotWithShape="0">
                     <a:srgbClr val="000000">
@@ -3137,7 +3145,7 @@
           </a:ln>
           <a:extLst>
             <a:ext uri="{91240B29-F687-4f45-9708-019B960494DF}">
-              <a14:hiddenLine xmlns:a14="http://schemas.microsoft.com/office/drawing/2010/main" xmlns="" w="9525">
+              <a14:hiddenLine xmlns="" xmlns:a14="http://schemas.microsoft.com/office/drawing/2010/main" w="9525">
                 <a:solidFill>
                   <a:schemeClr val="tx1"/>
                 </a:solidFill>
@@ -3188,7 +3196,7 @@
           <a:noFill/>
           <a:extLst>
             <a:ext uri="{909E8E84-426E-40dd-AFC4-6F175D3DCCD1}">
-              <a14:hiddenFill xmlns:a14="http://schemas.microsoft.com/office/drawing/2010/main" xmlns="">
+              <a14:hiddenFill xmlns="" xmlns:a14="http://schemas.microsoft.com/office/drawing/2010/main">
                 <a:solidFill>
                   <a:srgbClr val="FFFFFF"/>
                 </a:solidFill>
@@ -3224,7 +3232,7 @@
           </a:ln>
           <a:extLst>
             <a:ext uri="{909E8E84-426E-40dd-AFC4-6F175D3DCCD1}">
-              <a14:hiddenFill xmlns:a14="http://schemas.microsoft.com/office/drawing/2010/main" xmlns="">
+              <a14:hiddenFill xmlns="" xmlns:a14="http://schemas.microsoft.com/office/drawing/2010/main">
                 <a:noFill/>
               </a14:hiddenFill>
             </a:ext>
@@ -3689,14 +3697,14 @@
           </a:ln>
           <a:extLst>
             <a:ext uri="{909E8E84-426E-40dd-AFC4-6F175D3DCCD1}">
-              <a14:hiddenFill xmlns:a14="http://schemas.microsoft.com/office/drawing/2010/main" xmlns="">
+              <a14:hiddenFill xmlns="" xmlns:a14="http://schemas.microsoft.com/office/drawing/2010/main">
                 <a:solidFill>
                   <a:schemeClr val="accent1"/>
                 </a:solidFill>
               </a14:hiddenFill>
             </a:ext>
             <a:ext uri="{91240B29-F687-4f45-9708-019B960494DF}">
-              <a14:hiddenLine xmlns:a14="http://schemas.microsoft.com/office/drawing/2010/main" xmlns="" w="9525">
+              <a14:hiddenLine xmlns="" xmlns:a14="http://schemas.microsoft.com/office/drawing/2010/main" w="9525">
                 <a:solidFill>
                   <a:schemeClr val="tx1"/>
                 </a:solidFill>
@@ -3740,14 +3748,14 @@
           <a:effectLst/>
           <a:extLst>
             <a:ext uri="{909E8E84-426E-40dd-AFC4-6F175D3DCCD1}">
-              <a14:hiddenFill xmlns:a14="http://schemas.microsoft.com/office/drawing/2010/main" xmlns="">
+              <a14:hiddenFill xmlns="" xmlns:a14="http://schemas.microsoft.com/office/drawing/2010/main">
                 <a:solidFill>
                   <a:schemeClr val="accent1"/>
                 </a:solidFill>
               </a14:hiddenFill>
             </a:ext>
             <a:ext uri="{91240B29-F687-4f45-9708-019B960494DF}">
-              <a14:hiddenLine xmlns:a14="http://schemas.microsoft.com/office/drawing/2010/main" xmlns="" w="9525">
+              <a14:hiddenLine xmlns="" xmlns:a14="http://schemas.microsoft.com/office/drawing/2010/main" w="9525">
                 <a:solidFill>
                   <a:schemeClr val="tx1"/>
                 </a:solidFill>
@@ -3757,7 +3765,7 @@
               </a14:hiddenLine>
             </a:ext>
             <a:ext uri="{AF507438-7753-43e0-B8FC-AC1667EBCBE1}">
-              <a14:hiddenEffects xmlns:a14="http://schemas.microsoft.com/office/drawing/2010/main" xmlns="">
+              <a14:hiddenEffects xmlns="" xmlns:a14="http://schemas.microsoft.com/office/drawing/2010/main">
                 <a:effectLst>
                   <a:outerShdw blurRad="63500" dist="38099" dir="2700000" algn="ctr" rotWithShape="0">
                     <a:schemeClr val="bg2">
@@ -3831,14 +3839,14 @@
           <a:effectLst/>
           <a:extLst>
             <a:ext uri="{909E8E84-426E-40dd-AFC4-6F175D3DCCD1}">
-              <a14:hiddenFill xmlns:a14="http://schemas.microsoft.com/office/drawing/2010/main" xmlns="">
+              <a14:hiddenFill xmlns="" xmlns:a14="http://schemas.microsoft.com/office/drawing/2010/main">
                 <a:solidFill>
                   <a:schemeClr val="accent1"/>
                 </a:solidFill>
               </a14:hiddenFill>
             </a:ext>
             <a:ext uri="{91240B29-F687-4f45-9708-019B960494DF}">
-              <a14:hiddenLine xmlns:a14="http://schemas.microsoft.com/office/drawing/2010/main" xmlns="" w="9525">
+              <a14:hiddenLine xmlns="" xmlns:a14="http://schemas.microsoft.com/office/drawing/2010/main" w="9525">
                 <a:solidFill>
                   <a:schemeClr val="tx1"/>
                 </a:solidFill>
@@ -3848,7 +3856,7 @@
               </a14:hiddenLine>
             </a:ext>
             <a:ext uri="{AF507438-7753-43e0-B8FC-AC1667EBCBE1}">
-              <a14:hiddenEffects xmlns:a14="http://schemas.microsoft.com/office/drawing/2010/main" xmlns="">
+              <a14:hiddenEffects xmlns="" xmlns:a14="http://schemas.microsoft.com/office/drawing/2010/main">
                 <a:effectLst>
                   <a:outerShdw blurRad="63500" dist="38099" dir="2700000" algn="ctr" rotWithShape="0">
                     <a:schemeClr val="bg2">
@@ -3906,14 +3914,14 @@
           </a:ln>
           <a:extLst>
             <a:ext uri="{909E8E84-426E-40dd-AFC4-6F175D3DCCD1}">
-              <a14:hiddenFill xmlns:a14="http://schemas.microsoft.com/office/drawing/2010/main" xmlns="">
+              <a14:hiddenFill xmlns="" xmlns:a14="http://schemas.microsoft.com/office/drawing/2010/main">
                 <a:solidFill>
                   <a:schemeClr val="accent1"/>
                 </a:solidFill>
               </a14:hiddenFill>
             </a:ext>
             <a:ext uri="{91240B29-F687-4f45-9708-019B960494DF}">
-              <a14:hiddenLine xmlns:a14="http://schemas.microsoft.com/office/drawing/2010/main" xmlns="" w="9525">
+              <a14:hiddenLine xmlns="" xmlns:a14="http://schemas.microsoft.com/office/drawing/2010/main" w="9525">
                 <a:solidFill>
                   <a:schemeClr val="tx1"/>
                 </a:solidFill>
@@ -3965,6 +3973,292 @@
         </p:spPr>
       </p:pic>
     </p:spTree>
+  </p:cSld>
+  <p:clrMapOvr>
+    <a:masterClrMapping/>
+  </p:clrMapOvr>
+  <p:transition>
+    <p:dissolve/>
+  </p:transition>
+  <p:timing>
+    <p:tnLst>
+      <p:par>
+        <p:cTn id="1" dur="indefinite" restart="never" nodeType="tmRoot"/>
+      </p:par>
+    </p:tnLst>
+  </p:timing>
+</p:sld>
+</file>
+
+<file path=ppt/slides/slide10.xml><?xml version="1.0" encoding="utf-8"?>
+<p:sld xmlns:a="http://schemas.openxmlformats.org/drawingml/2006/main" xmlns:r="http://schemas.openxmlformats.org/officeDocument/2006/relationships" xmlns:p="http://schemas.openxmlformats.org/presentationml/2006/main">
+  <p:cSld>
+    <p:spTree>
+      <p:nvGrpSpPr>
+        <p:cNvPr id="1" name=""/>
+        <p:cNvGrpSpPr/>
+        <p:nvPr/>
+      </p:nvGrpSpPr>
+      <p:grpSpPr>
+        <a:xfrm>
+          <a:off x="0" y="0"/>
+          <a:ext cx="0" cy="0"/>
+          <a:chOff x="0" y="0"/>
+          <a:chExt cx="0" cy="0"/>
+        </a:xfrm>
+      </p:grpSpPr>
+      <p:sp>
+        <p:nvSpPr>
+          <p:cNvPr id="2" name="Titel 1"/>
+          <p:cNvSpPr>
+            <a:spLocks noGrp="1"/>
+          </p:cNvSpPr>
+          <p:nvPr>
+            <p:ph type="title"/>
+          </p:nvPr>
+        </p:nvSpPr>
+        <p:spPr>
+          <a:xfrm>
+            <a:off x="457200" y="1206243"/>
+            <a:ext cx="8229600" cy="1143000"/>
+          </a:xfrm>
+        </p:spPr>
+        <p:txBody>
+          <a:bodyPr/>
+          <a:lstStyle/>
+          <a:p>
+            <a:pPr algn="l"/>
+            <a:r>
+              <a:rPr lang="de-DE" sz="3600" dirty="0" smtClean="0"/>
+              <a:t>Der </a:t>
+            </a:r>
+            <a:r>
+              <a:rPr lang="de-DE" sz="3600" dirty="0" err="1" smtClean="0"/>
+              <a:t>Raspberry</a:t>
+            </a:r>
+            <a:r>
+              <a:rPr lang="de-DE" sz="3600" dirty="0" smtClean="0"/>
+              <a:t> Pi </a:t>
+            </a:r>
+            <a:r>
+              <a:rPr lang="de-DE" sz="3600" dirty="0" smtClean="0"/>
+              <a:t>2</a:t>
+            </a:r>
+            <a:r>
+              <a:rPr lang="de-DE" sz="3600" dirty="0"/>
+              <a:t/>
+            </a:r>
+            <a:br>
+              <a:rPr lang="de-DE" sz="3600" dirty="0"/>
+            </a:br>
+            <a:r>
+              <a:rPr lang="de-DE" sz="3200" dirty="0" smtClean="0"/>
+              <a:t>Backups und Mails</a:t>
+            </a:r>
+            <a:endParaRPr lang="de-DE" sz="3200" dirty="0"/>
+          </a:p>
+        </p:txBody>
+      </p:sp>
+      <p:sp>
+        <p:nvSpPr>
+          <p:cNvPr id="4" name="Inhaltsplatzhalter 3"/>
+          <p:cNvSpPr>
+            <a:spLocks noGrp="1"/>
+          </p:cNvSpPr>
+          <p:nvPr>
+            <p:ph sz="half" idx="1"/>
+          </p:nvPr>
+        </p:nvSpPr>
+        <p:spPr>
+          <a:xfrm>
+            <a:off x="457200" y="2438400"/>
+            <a:ext cx="4038600" cy="3687763"/>
+          </a:xfrm>
+        </p:spPr>
+        <p:txBody>
+          <a:bodyPr/>
+          <a:lstStyle/>
+          <a:p>
+            <a:pPr lvl="1"/>
+            <a:endParaRPr lang="de-DE" dirty="0" smtClean="0"/>
+          </a:p>
+        </p:txBody>
+      </p:sp>
+      <p:sp>
+        <p:nvSpPr>
+          <p:cNvPr id="6" name="Inhaltsplatzhalter 5"/>
+          <p:cNvSpPr>
+            <a:spLocks noGrp="1"/>
+          </p:cNvSpPr>
+          <p:nvPr>
+            <p:ph sz="half" idx="2"/>
+          </p:nvPr>
+        </p:nvSpPr>
+        <p:spPr>
+          <a:xfrm>
+            <a:off x="4648200" y="2438400"/>
+            <a:ext cx="4038600" cy="3687763"/>
+          </a:xfrm>
+        </p:spPr>
+        <p:txBody>
+          <a:bodyPr/>
+          <a:lstStyle/>
+          <a:p>
+            <a:endParaRPr lang="de-DE" dirty="0"/>
+          </a:p>
+        </p:txBody>
+      </p:sp>
+    </p:spTree>
+    <p:extLst>
+      <p:ext uri="{BB962C8B-B14F-4D97-AF65-F5344CB8AC3E}">
+        <p14:creationId xmlns:p14="http://schemas.microsoft.com/office/powerpoint/2010/main" val="1383918532"/>
+      </p:ext>
+    </p:extLst>
+  </p:cSld>
+  <p:clrMapOvr>
+    <a:masterClrMapping/>
+  </p:clrMapOvr>
+  <p:transition>
+    <p:dissolve/>
+  </p:transition>
+  <p:timing>
+    <p:tnLst>
+      <p:par>
+        <p:cTn id="1" dur="indefinite" restart="never" nodeType="tmRoot"/>
+      </p:par>
+    </p:tnLst>
+  </p:timing>
+</p:sld>
+</file>
+
+<file path=ppt/slides/slide11.xml><?xml version="1.0" encoding="utf-8"?>
+<p:sld xmlns:a="http://schemas.openxmlformats.org/drawingml/2006/main" xmlns:r="http://schemas.openxmlformats.org/officeDocument/2006/relationships" xmlns:p="http://schemas.openxmlformats.org/presentationml/2006/main">
+  <p:cSld>
+    <p:spTree>
+      <p:nvGrpSpPr>
+        <p:cNvPr id="1" name=""/>
+        <p:cNvGrpSpPr/>
+        <p:nvPr/>
+      </p:nvGrpSpPr>
+      <p:grpSpPr>
+        <a:xfrm>
+          <a:off x="0" y="0"/>
+          <a:ext cx="0" cy="0"/>
+          <a:chOff x="0" y="0"/>
+          <a:chExt cx="0" cy="0"/>
+        </a:xfrm>
+      </p:grpSpPr>
+      <p:sp>
+        <p:nvSpPr>
+          <p:cNvPr id="2" name="Titel 1"/>
+          <p:cNvSpPr>
+            <a:spLocks noGrp="1"/>
+          </p:cNvSpPr>
+          <p:nvPr>
+            <p:ph type="title"/>
+          </p:nvPr>
+        </p:nvSpPr>
+        <p:spPr>
+          <a:xfrm>
+            <a:off x="457200" y="1206243"/>
+            <a:ext cx="8229600" cy="1143000"/>
+          </a:xfrm>
+        </p:spPr>
+        <p:txBody>
+          <a:bodyPr/>
+          <a:lstStyle/>
+          <a:p>
+            <a:pPr algn="l"/>
+            <a:r>
+              <a:rPr lang="de-DE" sz="3600" dirty="0" smtClean="0"/>
+              <a:t>Der </a:t>
+            </a:r>
+            <a:r>
+              <a:rPr lang="de-DE" sz="3600" dirty="0" err="1" smtClean="0"/>
+              <a:t>Raspberry</a:t>
+            </a:r>
+            <a:r>
+              <a:rPr lang="de-DE" sz="3600" dirty="0" smtClean="0"/>
+              <a:t> Pi </a:t>
+            </a:r>
+            <a:r>
+              <a:rPr lang="de-DE" sz="3600" dirty="0" smtClean="0"/>
+              <a:t>2</a:t>
+            </a:r>
+            <a:r>
+              <a:rPr lang="de-DE" sz="3600" dirty="0"/>
+              <a:t/>
+            </a:r>
+            <a:br>
+              <a:rPr lang="de-DE" sz="3600" dirty="0"/>
+            </a:br>
+            <a:r>
+              <a:rPr lang="de-DE" sz="3200" dirty="0" smtClean="0"/>
+              <a:t>Autostart von </a:t>
+            </a:r>
+            <a:r>
+              <a:rPr lang="de-DE" sz="3200" smtClean="0"/>
+              <a:t>Tally</a:t>
+            </a:r>
+            <a:endParaRPr lang="de-DE" sz="3200" dirty="0"/>
+          </a:p>
+        </p:txBody>
+      </p:sp>
+      <p:sp>
+        <p:nvSpPr>
+          <p:cNvPr id="4" name="Inhaltsplatzhalter 3"/>
+          <p:cNvSpPr>
+            <a:spLocks noGrp="1"/>
+          </p:cNvSpPr>
+          <p:nvPr>
+            <p:ph sz="half" idx="1"/>
+          </p:nvPr>
+        </p:nvSpPr>
+        <p:spPr>
+          <a:xfrm>
+            <a:off x="457200" y="2438400"/>
+            <a:ext cx="4038600" cy="3687763"/>
+          </a:xfrm>
+        </p:spPr>
+        <p:txBody>
+          <a:bodyPr/>
+          <a:lstStyle/>
+          <a:p>
+            <a:pPr lvl="1"/>
+            <a:endParaRPr lang="de-DE" dirty="0" smtClean="0"/>
+          </a:p>
+        </p:txBody>
+      </p:sp>
+      <p:sp>
+        <p:nvSpPr>
+          <p:cNvPr id="6" name="Inhaltsplatzhalter 5"/>
+          <p:cNvSpPr>
+            <a:spLocks noGrp="1"/>
+          </p:cNvSpPr>
+          <p:nvPr>
+            <p:ph sz="half" idx="2"/>
+          </p:nvPr>
+        </p:nvSpPr>
+        <p:spPr>
+          <a:xfrm>
+            <a:off x="4648200" y="2438400"/>
+            <a:ext cx="4038600" cy="3687763"/>
+          </a:xfrm>
+        </p:spPr>
+        <p:txBody>
+          <a:bodyPr/>
+          <a:lstStyle/>
+          <a:p>
+            <a:endParaRPr lang="de-DE" dirty="0"/>
+          </a:p>
+        </p:txBody>
+      </p:sp>
+    </p:spTree>
+    <p:extLst>
+      <p:ext uri="{BB962C8B-B14F-4D97-AF65-F5344CB8AC3E}">
+        <p14:creationId xmlns:p14="http://schemas.microsoft.com/office/powerpoint/2010/main" val="176377381"/>
+      </p:ext>
+    </p:extLst>
   </p:cSld>
   <p:clrMapOvr>
     <a:masterClrMapping/>
@@ -4022,14 +4316,14 @@
           <a:effectLst/>
           <a:extLst>
             <a:ext uri="{909E8E84-426E-40dd-AFC4-6F175D3DCCD1}">
-              <a14:hiddenFill xmlns:a14="http://schemas.microsoft.com/office/drawing/2010/main" xmlns="">
+              <a14:hiddenFill xmlns="" xmlns:a14="http://schemas.microsoft.com/office/drawing/2010/main">
                 <a:solidFill>
                   <a:schemeClr val="accent1"/>
                 </a:solidFill>
               </a14:hiddenFill>
             </a:ext>
             <a:ext uri="{91240B29-F687-4f45-9708-019B960494DF}">
-              <a14:hiddenLine xmlns:a14="http://schemas.microsoft.com/office/drawing/2010/main" xmlns="" w="9525">
+              <a14:hiddenLine xmlns="" xmlns:a14="http://schemas.microsoft.com/office/drawing/2010/main" w="9525">
                 <a:solidFill>
                   <a:schemeClr val="tx1"/>
                 </a:solidFill>
@@ -4039,7 +4333,7 @@
               </a14:hiddenLine>
             </a:ext>
             <a:ext uri="{AF507438-7753-43e0-B8FC-AC1667EBCBE1}">
-              <a14:hiddenEffects xmlns:a14="http://schemas.microsoft.com/office/drawing/2010/main" xmlns="">
+              <a14:hiddenEffects xmlns="" xmlns:a14="http://schemas.microsoft.com/office/drawing/2010/main">
                 <a:effectLst>
                   <a:outerShdw blurRad="63500" dist="38099" dir="2700000" algn="ctr" rotWithShape="0">
                     <a:schemeClr val="bg2">
@@ -4078,8 +4372,8 @@
         </p:nvSpPr>
         <p:spPr bwMode="auto">
           <a:xfrm>
-            <a:off x="1206500" y="1692275"/>
-            <a:ext cx="1537600" cy="400110"/>
+            <a:off x="1" y="1473140"/>
+            <a:ext cx="9144000" cy="584775"/>
           </a:xfrm>
           <a:prstGeom prst="rect">
             <a:avLst/>
@@ -4091,14 +4385,14 @@
           <a:effectLst/>
           <a:extLst>
             <a:ext uri="{909E8E84-426E-40dd-AFC4-6F175D3DCCD1}">
-              <a14:hiddenFill xmlns:a14="http://schemas.microsoft.com/office/drawing/2010/main" xmlns="">
+              <a14:hiddenFill xmlns="" xmlns:a14="http://schemas.microsoft.com/office/drawing/2010/main">
                 <a:solidFill>
                   <a:schemeClr val="accent1"/>
                 </a:solidFill>
               </a14:hiddenFill>
             </a:ext>
             <a:ext uri="{91240B29-F687-4f45-9708-019B960494DF}">
-              <a14:hiddenLine xmlns:a14="http://schemas.microsoft.com/office/drawing/2010/main" xmlns="" w="9525">
+              <a14:hiddenLine xmlns="" xmlns:a14="http://schemas.microsoft.com/office/drawing/2010/main" w="9525">
                 <a:solidFill>
                   <a:schemeClr val="tx1"/>
                 </a:solidFill>
@@ -4108,7 +4402,7 @@
               </a14:hiddenLine>
             </a:ext>
             <a:ext uri="{AF507438-7753-43e0-B8FC-AC1667EBCBE1}">
-              <a14:hiddenEffects xmlns:a14="http://schemas.microsoft.com/office/drawing/2010/main" xmlns="">
+              <a14:hiddenEffects xmlns="" xmlns:a14="http://schemas.microsoft.com/office/drawing/2010/main">
                 <a:effectLst>
                   <a:outerShdw blurRad="63500" dist="38099" dir="2700000" algn="ctr" rotWithShape="0">
                     <a:schemeClr val="bg2">
@@ -4121,21 +4415,22 @@
           </a:extLst>
         </p:spPr>
         <p:txBody>
-          <a:bodyPr wrap="none">
+          <a:bodyPr wrap="square">
             <a:spAutoFit/>
           </a:bodyPr>
           <a:lstStyle/>
           <a:p>
-            <a:r>
-              <a:rPr lang="de-DE" sz="2000" b="1" dirty="0" smtClean="0">
+            <a:pPr algn="ctr"/>
+            <a:r>
+              <a:rPr lang="de-DE" sz="3200" b="1" dirty="0" smtClean="0">
                 <a:solidFill>
                   <a:srgbClr val="001F5B"/>
                 </a:solidFill>
                 <a:latin typeface="ArialBold" charset="0"/>
               </a:rPr>
-              <a:t>Gliederung</a:t>
-            </a:r>
-            <a:endParaRPr lang="de-DE" dirty="0">
+              <a:t>Die Gliederung</a:t>
+            </a:r>
+            <a:endParaRPr lang="de-DE" sz="3200" dirty="0">
               <a:solidFill>
                 <a:srgbClr val="002664"/>
               </a:solidFill>
@@ -4240,9 +4535,24 @@
             </a:r>
             <a:r>
               <a:rPr lang="de-DE" sz="3600" dirty="0" smtClean="0"/>
-              <a:t> Pi 2</a:t>
-            </a:r>
-            <a:endParaRPr lang="de-DE" sz="3600" dirty="0"/>
+              <a:t> Pi </a:t>
+            </a:r>
+            <a:r>
+              <a:rPr lang="de-DE" sz="3600" dirty="0" smtClean="0"/>
+              <a:t>2</a:t>
+            </a:r>
+            <a:r>
+              <a:rPr lang="de-DE" sz="3600" dirty="0"/>
+              <a:t/>
+            </a:r>
+            <a:br>
+              <a:rPr lang="de-DE" sz="3600" dirty="0"/>
+            </a:br>
+            <a:r>
+              <a:rPr lang="de-DE" sz="3200" dirty="0" smtClean="0"/>
+              <a:t>Die Hardware</a:t>
+            </a:r>
+            <a:endParaRPr lang="de-DE" sz="3200" dirty="0"/>
           </a:p>
         </p:txBody>
       </p:sp>
@@ -4266,34 +4576,67 @@
           <a:bodyPr/>
           <a:lstStyle/>
           <a:p>
+            <a:r>
+              <a:rPr lang="de-DE" dirty="0" smtClean="0"/>
+              <a:t>Vier Kerne a 900 MHz</a:t>
+            </a:r>
+          </a:p>
+          <a:p>
+            <a:r>
+              <a:rPr lang="de-DE" dirty="0" smtClean="0"/>
+              <a:t>1GB Arbeitsspeicher</a:t>
+            </a:r>
+          </a:p>
+          <a:p>
+            <a:r>
+              <a:rPr lang="de-DE" dirty="0" smtClean="0"/>
+              <a:t>1 Ethernet Port</a:t>
+            </a:r>
+          </a:p>
+          <a:p>
+            <a:r>
+              <a:rPr lang="de-DE" dirty="0" smtClean="0"/>
+              <a:t>4 USB Ports</a:t>
+            </a:r>
+          </a:p>
+          <a:p>
+            <a:r>
+              <a:rPr lang="de-DE" dirty="0" smtClean="0"/>
+              <a:t>SD-Kartenslot</a:t>
+            </a:r>
             <a:endParaRPr lang="de-DE" dirty="0"/>
           </a:p>
         </p:txBody>
       </p:sp>
-      <p:sp>
-        <p:nvSpPr>
-          <p:cNvPr id="5" name="Inhaltsplatzhalter 4"/>
-          <p:cNvSpPr>
-            <a:spLocks noGrp="1"/>
-          </p:cNvSpPr>
+      <p:pic>
+        <p:nvPicPr>
+          <p:cNvPr id="3" name="Inhaltsplatzhalter 2"/>
+          <p:cNvPicPr>
+            <a:picLocks noGrp="1" noChangeAspect="1"/>
+          </p:cNvPicPr>
           <p:nvPr>
             <p:ph sz="half" idx="2"/>
           </p:nvPr>
-        </p:nvSpPr>
+        </p:nvPicPr>
+        <p:blipFill>
+          <a:blip r:embed="rId2">
+            <a:extLst>
+              <a:ext uri="{28A0092B-C50C-407E-A947-70E740481C1C}">
+                <a14:useLocalDpi xmlns:a14="http://schemas.microsoft.com/office/drawing/2010/main" val="0"/>
+              </a:ext>
+            </a:extLst>
+          </a:blip>
+          <a:stretch>
+            <a:fillRect/>
+          </a:stretch>
+        </p:blipFill>
         <p:spPr>
           <a:xfrm>
-            <a:off x="4648200" y="2438400"/>
-            <a:ext cx="4038600" cy="3687763"/>
-          </a:xfrm>
-        </p:spPr>
-        <p:txBody>
-          <a:bodyPr/>
-          <a:lstStyle/>
-          <a:p>
-            <a:endParaRPr lang="de-DE" dirty="0"/>
-          </a:p>
-        </p:txBody>
-      </p:sp>
+            <a:off x="4648200" y="3144370"/>
+            <a:ext cx="4038600" cy="2275823"/>
+          </a:xfrm>
+        </p:spPr>
+      </p:pic>
     </p:spTree>
     <p:extLst>
       <p:ext uri="{BB962C8B-B14F-4D97-AF65-F5344CB8AC3E}">
@@ -4307,6 +4650,940 @@
   <p:transition>
     <p:dissolve/>
   </p:transition>
+</p:sld>
+</file>
+
+<file path=ppt/slides/slide4.xml><?xml version="1.0" encoding="utf-8"?>
+<p:sld xmlns:a="http://schemas.openxmlformats.org/drawingml/2006/main" xmlns:r="http://schemas.openxmlformats.org/officeDocument/2006/relationships" xmlns:p="http://schemas.openxmlformats.org/presentationml/2006/main">
+  <p:cSld>
+    <p:spTree>
+      <p:nvGrpSpPr>
+        <p:cNvPr id="1" name=""/>
+        <p:cNvGrpSpPr/>
+        <p:nvPr/>
+      </p:nvGrpSpPr>
+      <p:grpSpPr>
+        <a:xfrm>
+          <a:off x="0" y="0"/>
+          <a:ext cx="0" cy="0"/>
+          <a:chOff x="0" y="0"/>
+          <a:chExt cx="0" cy="0"/>
+        </a:xfrm>
+      </p:grpSpPr>
+      <p:sp>
+        <p:nvSpPr>
+          <p:cNvPr id="2" name="Titel 1"/>
+          <p:cNvSpPr>
+            <a:spLocks noGrp="1"/>
+          </p:cNvSpPr>
+          <p:nvPr>
+            <p:ph type="title"/>
+          </p:nvPr>
+        </p:nvSpPr>
+        <p:spPr>
+          <a:xfrm>
+            <a:off x="457200" y="1206243"/>
+            <a:ext cx="8229600" cy="1143000"/>
+          </a:xfrm>
+        </p:spPr>
+        <p:txBody>
+          <a:bodyPr/>
+          <a:lstStyle/>
+          <a:p>
+            <a:pPr algn="l"/>
+            <a:r>
+              <a:rPr lang="de-DE" sz="3600" dirty="0" smtClean="0"/>
+              <a:t>Der </a:t>
+            </a:r>
+            <a:r>
+              <a:rPr lang="de-DE" sz="3600" dirty="0" err="1" smtClean="0"/>
+              <a:t>Raspberry</a:t>
+            </a:r>
+            <a:r>
+              <a:rPr lang="de-DE" sz="3600" dirty="0" smtClean="0"/>
+              <a:t> Pi </a:t>
+            </a:r>
+            <a:r>
+              <a:rPr lang="de-DE" sz="3600" dirty="0" smtClean="0"/>
+              <a:t>2</a:t>
+            </a:r>
+            <a:r>
+              <a:rPr lang="de-DE" sz="3600" dirty="0"/>
+              <a:t/>
+            </a:r>
+            <a:br>
+              <a:rPr lang="de-DE" sz="3600" dirty="0"/>
+            </a:br>
+            <a:r>
+              <a:rPr lang="de-DE" sz="3200" dirty="0" smtClean="0"/>
+              <a:t>Das Betriebssystem</a:t>
+            </a:r>
+            <a:endParaRPr lang="de-DE" sz="3200" dirty="0"/>
+          </a:p>
+        </p:txBody>
+      </p:sp>
+      <p:sp>
+        <p:nvSpPr>
+          <p:cNvPr id="4" name="Inhaltsplatzhalter 3"/>
+          <p:cNvSpPr>
+            <a:spLocks noGrp="1"/>
+          </p:cNvSpPr>
+          <p:nvPr>
+            <p:ph sz="half" idx="1"/>
+          </p:nvPr>
+        </p:nvSpPr>
+        <p:spPr>
+          <a:xfrm>
+            <a:off x="457200" y="2438400"/>
+            <a:ext cx="4038600" cy="3687763"/>
+          </a:xfrm>
+        </p:spPr>
+        <p:txBody>
+          <a:bodyPr/>
+          <a:lstStyle/>
+          <a:p>
+            <a:r>
+              <a:rPr lang="de-DE" dirty="0" err="1" smtClean="0"/>
+              <a:t>Raspbian</a:t>
+            </a:r>
+            <a:r>
+              <a:rPr lang="de-DE" dirty="0" smtClean="0"/>
+              <a:t> OS</a:t>
+            </a:r>
+          </a:p>
+          <a:p>
+            <a:pPr lvl="1"/>
+            <a:r>
+              <a:rPr lang="de-DE" dirty="0" smtClean="0"/>
+              <a:t>LXDE </a:t>
+            </a:r>
+            <a:r>
+              <a:rPr lang="de-DE" dirty="0" err="1" smtClean="0"/>
+              <a:t>desktop</a:t>
+            </a:r>
+            <a:endParaRPr lang="de-DE" dirty="0" smtClean="0"/>
+          </a:p>
+          <a:p>
+            <a:pPr lvl="1"/>
+            <a:r>
+              <a:rPr lang="de-DE" dirty="0" err="1" smtClean="0"/>
+              <a:t>Debianderivat</a:t>
+            </a:r>
+            <a:endParaRPr lang="de-DE" dirty="0" smtClean="0"/>
+          </a:p>
+          <a:p>
+            <a:pPr lvl="1"/>
+            <a:r>
+              <a:rPr lang="de-DE" dirty="0" err="1" smtClean="0"/>
+              <a:t>Raspberry</a:t>
+            </a:r>
+            <a:r>
+              <a:rPr lang="de-DE" dirty="0" smtClean="0"/>
+              <a:t> optimiert</a:t>
+            </a:r>
+          </a:p>
+          <a:p>
+            <a:pPr lvl="1"/>
+            <a:r>
+              <a:rPr lang="de-DE" dirty="0" smtClean="0"/>
+              <a:t>Große Community</a:t>
+            </a:r>
+            <a:endParaRPr lang="de-DE" dirty="0"/>
+          </a:p>
+        </p:txBody>
+      </p:sp>
+      <p:sp>
+        <p:nvSpPr>
+          <p:cNvPr id="5" name="Inhaltsplatzhalter 4"/>
+          <p:cNvSpPr>
+            <a:spLocks noGrp="1"/>
+          </p:cNvSpPr>
+          <p:nvPr>
+            <p:ph sz="half" idx="2"/>
+          </p:nvPr>
+        </p:nvSpPr>
+        <p:spPr>
+          <a:xfrm>
+            <a:off x="4648200" y="2438400"/>
+            <a:ext cx="4038600" cy="3687763"/>
+          </a:xfrm>
+        </p:spPr>
+        <p:txBody>
+          <a:bodyPr/>
+          <a:lstStyle/>
+          <a:p>
+            <a:r>
+              <a:rPr lang="de-DE" dirty="0" smtClean="0"/>
+              <a:t>Ubuntu 14.04 LTS</a:t>
+            </a:r>
+          </a:p>
+          <a:p>
+            <a:pPr lvl="1"/>
+            <a:r>
+              <a:rPr lang="de-DE" dirty="0" err="1" smtClean="0"/>
+              <a:t>Unity</a:t>
+            </a:r>
+            <a:r>
+              <a:rPr lang="de-DE" dirty="0" smtClean="0"/>
+              <a:t> </a:t>
+            </a:r>
+            <a:r>
+              <a:rPr lang="de-DE" dirty="0" err="1" smtClean="0"/>
+              <a:t>desktop</a:t>
+            </a:r>
+            <a:endParaRPr lang="de-DE" dirty="0" smtClean="0"/>
+          </a:p>
+          <a:p>
+            <a:pPr lvl="1"/>
+            <a:r>
+              <a:rPr lang="de-DE" dirty="0" err="1" smtClean="0"/>
+              <a:t>Debianderivat</a:t>
+            </a:r>
+            <a:endParaRPr lang="de-DE" dirty="0" smtClean="0"/>
+          </a:p>
+          <a:p>
+            <a:pPr lvl="1"/>
+            <a:r>
+              <a:rPr lang="de-DE" dirty="0" smtClean="0"/>
+              <a:t>Einrichten für den </a:t>
+            </a:r>
+            <a:r>
+              <a:rPr lang="de-DE" dirty="0" err="1" smtClean="0"/>
+              <a:t>Raspberry</a:t>
+            </a:r>
+            <a:r>
+              <a:rPr lang="de-DE" dirty="0" smtClean="0"/>
+              <a:t> erforderlich</a:t>
+            </a:r>
+            <a:endParaRPr lang="de-DE" dirty="0"/>
+          </a:p>
+        </p:txBody>
+      </p:sp>
+    </p:spTree>
+    <p:extLst>
+      <p:ext uri="{BB962C8B-B14F-4D97-AF65-F5344CB8AC3E}">
+        <p14:creationId xmlns:p14="http://schemas.microsoft.com/office/powerpoint/2010/main" val="3064458738"/>
+      </p:ext>
+    </p:extLst>
+  </p:cSld>
+  <p:clrMapOvr>
+    <a:masterClrMapping/>
+  </p:clrMapOvr>
+  <p:transition>
+    <p:dissolve/>
+  </p:transition>
+  <p:timing>
+    <p:tnLst>
+      <p:par>
+        <p:cTn id="1" dur="indefinite" restart="never" nodeType="tmRoot"/>
+      </p:par>
+    </p:tnLst>
+  </p:timing>
+</p:sld>
+</file>
+
+<file path=ppt/slides/slide5.xml><?xml version="1.0" encoding="utf-8"?>
+<p:sld xmlns:a="http://schemas.openxmlformats.org/drawingml/2006/main" xmlns:r="http://schemas.openxmlformats.org/officeDocument/2006/relationships" xmlns:p="http://schemas.openxmlformats.org/presentationml/2006/main">
+  <p:cSld>
+    <p:spTree>
+      <p:nvGrpSpPr>
+        <p:cNvPr id="1" name=""/>
+        <p:cNvGrpSpPr/>
+        <p:nvPr/>
+      </p:nvGrpSpPr>
+      <p:grpSpPr>
+        <a:xfrm>
+          <a:off x="0" y="0"/>
+          <a:ext cx="0" cy="0"/>
+          <a:chOff x="0" y="0"/>
+          <a:chExt cx="0" cy="0"/>
+        </a:xfrm>
+      </p:grpSpPr>
+      <p:sp>
+        <p:nvSpPr>
+          <p:cNvPr id="2" name="Titel 1"/>
+          <p:cNvSpPr>
+            <a:spLocks noGrp="1"/>
+          </p:cNvSpPr>
+          <p:nvPr>
+            <p:ph type="title"/>
+          </p:nvPr>
+        </p:nvSpPr>
+        <p:spPr>
+          <a:xfrm>
+            <a:off x="457200" y="1206243"/>
+            <a:ext cx="8229600" cy="1143000"/>
+          </a:xfrm>
+        </p:spPr>
+        <p:txBody>
+          <a:bodyPr/>
+          <a:lstStyle/>
+          <a:p>
+            <a:pPr algn="l"/>
+            <a:r>
+              <a:rPr lang="de-DE" sz="3600" dirty="0" smtClean="0"/>
+              <a:t>Der </a:t>
+            </a:r>
+            <a:r>
+              <a:rPr lang="de-DE" sz="3600" dirty="0" err="1" smtClean="0"/>
+              <a:t>Raspberry</a:t>
+            </a:r>
+            <a:r>
+              <a:rPr lang="de-DE" sz="3600" dirty="0" smtClean="0"/>
+              <a:t> Pi </a:t>
+            </a:r>
+            <a:r>
+              <a:rPr lang="de-DE" sz="3600" dirty="0" smtClean="0"/>
+              <a:t>2</a:t>
+            </a:r>
+            <a:r>
+              <a:rPr lang="de-DE" sz="3600" dirty="0"/>
+              <a:t/>
+            </a:r>
+            <a:br>
+              <a:rPr lang="de-DE" sz="3600" dirty="0"/>
+            </a:br>
+            <a:r>
+              <a:rPr lang="de-DE" sz="3200" dirty="0" smtClean="0"/>
+              <a:t>Remote Desktop</a:t>
+            </a:r>
+            <a:endParaRPr lang="de-DE" sz="3200" dirty="0"/>
+          </a:p>
+        </p:txBody>
+      </p:sp>
+      <p:sp>
+        <p:nvSpPr>
+          <p:cNvPr id="4" name="Inhaltsplatzhalter 3"/>
+          <p:cNvSpPr>
+            <a:spLocks noGrp="1"/>
+          </p:cNvSpPr>
+          <p:nvPr>
+            <p:ph sz="half" idx="1"/>
+          </p:nvPr>
+        </p:nvSpPr>
+        <p:spPr>
+          <a:xfrm>
+            <a:off x="457200" y="2438400"/>
+            <a:ext cx="4038600" cy="3687763"/>
+          </a:xfrm>
+        </p:spPr>
+        <p:txBody>
+          <a:bodyPr/>
+          <a:lstStyle/>
+          <a:p>
+            <a:pPr lvl="1"/>
+            <a:endParaRPr lang="de-DE" dirty="0" smtClean="0"/>
+          </a:p>
+        </p:txBody>
+      </p:sp>
+      <p:sp>
+        <p:nvSpPr>
+          <p:cNvPr id="6" name="Inhaltsplatzhalter 5"/>
+          <p:cNvSpPr>
+            <a:spLocks noGrp="1"/>
+          </p:cNvSpPr>
+          <p:nvPr>
+            <p:ph sz="half" idx="2"/>
+          </p:nvPr>
+        </p:nvSpPr>
+        <p:spPr>
+          <a:xfrm>
+            <a:off x="4648200" y="2438400"/>
+            <a:ext cx="4038600" cy="3687763"/>
+          </a:xfrm>
+        </p:spPr>
+        <p:txBody>
+          <a:bodyPr/>
+          <a:lstStyle/>
+          <a:p>
+            <a:endParaRPr lang="de-DE" dirty="0"/>
+          </a:p>
+        </p:txBody>
+      </p:sp>
+    </p:spTree>
+    <p:extLst>
+      <p:ext uri="{BB962C8B-B14F-4D97-AF65-F5344CB8AC3E}">
+        <p14:creationId xmlns:p14="http://schemas.microsoft.com/office/powerpoint/2010/main" val="3245234187"/>
+      </p:ext>
+    </p:extLst>
+  </p:cSld>
+  <p:clrMapOvr>
+    <a:masterClrMapping/>
+  </p:clrMapOvr>
+  <p:transition>
+    <p:dissolve/>
+  </p:transition>
+  <p:timing>
+    <p:tnLst>
+      <p:par>
+        <p:cTn id="1" dur="indefinite" restart="never" nodeType="tmRoot"/>
+      </p:par>
+    </p:tnLst>
+  </p:timing>
+</p:sld>
+</file>
+
+<file path=ppt/slides/slide6.xml><?xml version="1.0" encoding="utf-8"?>
+<p:sld xmlns:a="http://schemas.openxmlformats.org/drawingml/2006/main" xmlns:r="http://schemas.openxmlformats.org/officeDocument/2006/relationships" xmlns:p="http://schemas.openxmlformats.org/presentationml/2006/main">
+  <p:cSld>
+    <p:spTree>
+      <p:nvGrpSpPr>
+        <p:cNvPr id="1" name=""/>
+        <p:cNvGrpSpPr/>
+        <p:nvPr/>
+      </p:nvGrpSpPr>
+      <p:grpSpPr>
+        <a:xfrm>
+          <a:off x="0" y="0"/>
+          <a:ext cx="0" cy="0"/>
+          <a:chOff x="0" y="0"/>
+          <a:chExt cx="0" cy="0"/>
+        </a:xfrm>
+      </p:grpSpPr>
+      <p:sp>
+        <p:nvSpPr>
+          <p:cNvPr id="2" name="Titel 1"/>
+          <p:cNvSpPr>
+            <a:spLocks noGrp="1"/>
+          </p:cNvSpPr>
+          <p:nvPr>
+            <p:ph type="title"/>
+          </p:nvPr>
+        </p:nvSpPr>
+        <p:spPr>
+          <a:xfrm>
+            <a:off x="457200" y="1206243"/>
+            <a:ext cx="8229600" cy="1143000"/>
+          </a:xfrm>
+        </p:spPr>
+        <p:txBody>
+          <a:bodyPr/>
+          <a:lstStyle/>
+          <a:p>
+            <a:pPr algn="l"/>
+            <a:r>
+              <a:rPr lang="de-DE" sz="3600" dirty="0" smtClean="0"/>
+              <a:t>Der </a:t>
+            </a:r>
+            <a:r>
+              <a:rPr lang="de-DE" sz="3600" dirty="0" err="1" smtClean="0"/>
+              <a:t>Raspberry</a:t>
+            </a:r>
+            <a:r>
+              <a:rPr lang="de-DE" sz="3600" dirty="0" smtClean="0"/>
+              <a:t> Pi </a:t>
+            </a:r>
+            <a:r>
+              <a:rPr lang="de-DE" sz="3600" dirty="0" smtClean="0"/>
+              <a:t>2</a:t>
+            </a:r>
+            <a:r>
+              <a:rPr lang="de-DE" sz="3600" dirty="0"/>
+              <a:t/>
+            </a:r>
+            <a:br>
+              <a:rPr lang="de-DE" sz="3600" dirty="0"/>
+            </a:br>
+            <a:r>
+              <a:rPr lang="de-DE" sz="3200" dirty="0" smtClean="0"/>
+              <a:t>Der Webserver</a:t>
+            </a:r>
+            <a:endParaRPr lang="de-DE" sz="3200" dirty="0"/>
+          </a:p>
+        </p:txBody>
+      </p:sp>
+      <p:sp>
+        <p:nvSpPr>
+          <p:cNvPr id="4" name="Inhaltsplatzhalter 3"/>
+          <p:cNvSpPr>
+            <a:spLocks noGrp="1"/>
+          </p:cNvSpPr>
+          <p:nvPr>
+            <p:ph sz="half" idx="1"/>
+          </p:nvPr>
+        </p:nvSpPr>
+        <p:spPr>
+          <a:xfrm>
+            <a:off x="457200" y="2438400"/>
+            <a:ext cx="4038600" cy="3687763"/>
+          </a:xfrm>
+        </p:spPr>
+        <p:txBody>
+          <a:bodyPr/>
+          <a:lstStyle/>
+          <a:p>
+            <a:pPr lvl="1"/>
+            <a:endParaRPr lang="de-DE" dirty="0" smtClean="0"/>
+          </a:p>
+        </p:txBody>
+      </p:sp>
+      <p:sp>
+        <p:nvSpPr>
+          <p:cNvPr id="6" name="Inhaltsplatzhalter 5"/>
+          <p:cNvSpPr>
+            <a:spLocks noGrp="1"/>
+          </p:cNvSpPr>
+          <p:nvPr>
+            <p:ph sz="half" idx="2"/>
+          </p:nvPr>
+        </p:nvSpPr>
+        <p:spPr>
+          <a:xfrm>
+            <a:off x="4648200" y="2438400"/>
+            <a:ext cx="4038600" cy="3687763"/>
+          </a:xfrm>
+        </p:spPr>
+        <p:txBody>
+          <a:bodyPr/>
+          <a:lstStyle/>
+          <a:p>
+            <a:endParaRPr lang="de-DE" dirty="0"/>
+          </a:p>
+        </p:txBody>
+      </p:sp>
+    </p:spTree>
+    <p:extLst>
+      <p:ext uri="{BB962C8B-B14F-4D97-AF65-F5344CB8AC3E}">
+        <p14:creationId xmlns:p14="http://schemas.microsoft.com/office/powerpoint/2010/main" val="1461945958"/>
+      </p:ext>
+    </p:extLst>
+  </p:cSld>
+  <p:clrMapOvr>
+    <a:masterClrMapping/>
+  </p:clrMapOvr>
+  <p:transition>
+    <p:dissolve/>
+  </p:transition>
+  <p:timing>
+    <p:tnLst>
+      <p:par>
+        <p:cTn id="1" dur="indefinite" restart="never" nodeType="tmRoot"/>
+      </p:par>
+    </p:tnLst>
+  </p:timing>
+</p:sld>
+</file>
+
+<file path=ppt/slides/slide7.xml><?xml version="1.0" encoding="utf-8"?>
+<p:sld xmlns:a="http://schemas.openxmlformats.org/drawingml/2006/main" xmlns:r="http://schemas.openxmlformats.org/officeDocument/2006/relationships" xmlns:p="http://schemas.openxmlformats.org/presentationml/2006/main">
+  <p:cSld>
+    <p:spTree>
+      <p:nvGrpSpPr>
+        <p:cNvPr id="1" name=""/>
+        <p:cNvGrpSpPr/>
+        <p:nvPr/>
+      </p:nvGrpSpPr>
+      <p:grpSpPr>
+        <a:xfrm>
+          <a:off x="0" y="0"/>
+          <a:ext cx="0" cy="0"/>
+          <a:chOff x="0" y="0"/>
+          <a:chExt cx="0" cy="0"/>
+        </a:xfrm>
+      </p:grpSpPr>
+      <p:sp>
+        <p:nvSpPr>
+          <p:cNvPr id="2" name="Titel 1"/>
+          <p:cNvSpPr>
+            <a:spLocks noGrp="1"/>
+          </p:cNvSpPr>
+          <p:nvPr>
+            <p:ph type="title"/>
+          </p:nvPr>
+        </p:nvSpPr>
+        <p:spPr>
+          <a:xfrm>
+            <a:off x="457200" y="1206243"/>
+            <a:ext cx="8229600" cy="1143000"/>
+          </a:xfrm>
+        </p:spPr>
+        <p:txBody>
+          <a:bodyPr/>
+          <a:lstStyle/>
+          <a:p>
+            <a:pPr algn="l"/>
+            <a:r>
+              <a:rPr lang="de-DE" sz="3600" dirty="0" smtClean="0"/>
+              <a:t>Der </a:t>
+            </a:r>
+            <a:r>
+              <a:rPr lang="de-DE" sz="3600" dirty="0" err="1" smtClean="0"/>
+              <a:t>Raspberry</a:t>
+            </a:r>
+            <a:r>
+              <a:rPr lang="de-DE" sz="3600" dirty="0" smtClean="0"/>
+              <a:t> Pi </a:t>
+            </a:r>
+            <a:r>
+              <a:rPr lang="de-DE" sz="3600" dirty="0" smtClean="0"/>
+              <a:t>2</a:t>
+            </a:r>
+            <a:r>
+              <a:rPr lang="de-DE" sz="3600" dirty="0"/>
+              <a:t/>
+            </a:r>
+            <a:br>
+              <a:rPr lang="de-DE" sz="3600" dirty="0"/>
+            </a:br>
+            <a:r>
+              <a:rPr lang="de-DE" sz="3200" dirty="0" smtClean="0"/>
+              <a:t>Der passende Touchscreen</a:t>
+            </a:r>
+            <a:endParaRPr lang="de-DE" sz="3200" dirty="0"/>
+          </a:p>
+        </p:txBody>
+      </p:sp>
+      <p:sp>
+        <p:nvSpPr>
+          <p:cNvPr id="4" name="Inhaltsplatzhalter 3"/>
+          <p:cNvSpPr>
+            <a:spLocks noGrp="1"/>
+          </p:cNvSpPr>
+          <p:nvPr>
+            <p:ph sz="half" idx="1"/>
+          </p:nvPr>
+        </p:nvSpPr>
+        <p:spPr>
+          <a:xfrm>
+            <a:off x="457200" y="2438400"/>
+            <a:ext cx="4038600" cy="3687763"/>
+          </a:xfrm>
+        </p:spPr>
+        <p:txBody>
+          <a:bodyPr/>
+          <a:lstStyle/>
+          <a:p>
+            <a:pPr lvl="1"/>
+            <a:endParaRPr lang="de-DE" dirty="0" smtClean="0"/>
+          </a:p>
+        </p:txBody>
+      </p:sp>
+      <p:sp>
+        <p:nvSpPr>
+          <p:cNvPr id="6" name="Inhaltsplatzhalter 5"/>
+          <p:cNvSpPr>
+            <a:spLocks noGrp="1"/>
+          </p:cNvSpPr>
+          <p:nvPr>
+            <p:ph sz="half" idx="2"/>
+          </p:nvPr>
+        </p:nvSpPr>
+        <p:spPr>
+          <a:xfrm>
+            <a:off x="4648200" y="2438400"/>
+            <a:ext cx="4038600" cy="3687763"/>
+          </a:xfrm>
+        </p:spPr>
+        <p:txBody>
+          <a:bodyPr/>
+          <a:lstStyle/>
+          <a:p>
+            <a:endParaRPr lang="de-DE" dirty="0"/>
+          </a:p>
+        </p:txBody>
+      </p:sp>
+    </p:spTree>
+    <p:extLst>
+      <p:ext uri="{BB962C8B-B14F-4D97-AF65-F5344CB8AC3E}">
+        <p14:creationId xmlns:p14="http://schemas.microsoft.com/office/powerpoint/2010/main" val="2680953876"/>
+      </p:ext>
+    </p:extLst>
+  </p:cSld>
+  <p:clrMapOvr>
+    <a:masterClrMapping/>
+  </p:clrMapOvr>
+  <p:transition>
+    <p:dissolve/>
+  </p:transition>
+  <p:timing>
+    <p:tnLst>
+      <p:par>
+        <p:cTn id="1" dur="indefinite" restart="never" nodeType="tmRoot"/>
+      </p:par>
+    </p:tnLst>
+  </p:timing>
+</p:sld>
+</file>
+
+<file path=ppt/slides/slide8.xml><?xml version="1.0" encoding="utf-8"?>
+<p:sld xmlns:a="http://schemas.openxmlformats.org/drawingml/2006/main" xmlns:r="http://schemas.openxmlformats.org/officeDocument/2006/relationships" xmlns:p="http://schemas.openxmlformats.org/presentationml/2006/main">
+  <p:cSld>
+    <p:spTree>
+      <p:nvGrpSpPr>
+        <p:cNvPr id="1" name=""/>
+        <p:cNvGrpSpPr/>
+        <p:nvPr/>
+      </p:nvGrpSpPr>
+      <p:grpSpPr>
+        <a:xfrm>
+          <a:off x="0" y="0"/>
+          <a:ext cx="0" cy="0"/>
+          <a:chOff x="0" y="0"/>
+          <a:chExt cx="0" cy="0"/>
+        </a:xfrm>
+      </p:grpSpPr>
+      <p:sp>
+        <p:nvSpPr>
+          <p:cNvPr id="2" name="Titel 1"/>
+          <p:cNvSpPr>
+            <a:spLocks noGrp="1"/>
+          </p:cNvSpPr>
+          <p:nvPr>
+            <p:ph type="title"/>
+          </p:nvPr>
+        </p:nvSpPr>
+        <p:spPr>
+          <a:xfrm>
+            <a:off x="457200" y="1206243"/>
+            <a:ext cx="8229600" cy="1143000"/>
+          </a:xfrm>
+        </p:spPr>
+        <p:txBody>
+          <a:bodyPr/>
+          <a:lstStyle/>
+          <a:p>
+            <a:pPr algn="l"/>
+            <a:r>
+              <a:rPr lang="de-DE" sz="3600" dirty="0" smtClean="0"/>
+              <a:t>Der </a:t>
+            </a:r>
+            <a:r>
+              <a:rPr lang="de-DE" sz="3600" dirty="0" err="1" smtClean="0"/>
+              <a:t>Raspberry</a:t>
+            </a:r>
+            <a:r>
+              <a:rPr lang="de-DE" sz="3600" dirty="0" smtClean="0"/>
+              <a:t> Pi </a:t>
+            </a:r>
+            <a:r>
+              <a:rPr lang="de-DE" sz="3600" dirty="0" smtClean="0"/>
+              <a:t>2</a:t>
+            </a:r>
+            <a:r>
+              <a:rPr lang="de-DE" sz="3600" dirty="0"/>
+              <a:t/>
+            </a:r>
+            <a:br>
+              <a:rPr lang="de-DE" sz="3600" dirty="0"/>
+            </a:br>
+            <a:r>
+              <a:rPr lang="de-DE" sz="3200" dirty="0" smtClean="0"/>
+              <a:t>drahtlose Verbindung</a:t>
+            </a:r>
+            <a:endParaRPr lang="de-DE" sz="3200" dirty="0"/>
+          </a:p>
+        </p:txBody>
+      </p:sp>
+      <p:sp>
+        <p:nvSpPr>
+          <p:cNvPr id="4" name="Inhaltsplatzhalter 3"/>
+          <p:cNvSpPr>
+            <a:spLocks noGrp="1"/>
+          </p:cNvSpPr>
+          <p:nvPr>
+            <p:ph sz="half" idx="1"/>
+          </p:nvPr>
+        </p:nvSpPr>
+        <p:spPr>
+          <a:xfrm>
+            <a:off x="457200" y="2438400"/>
+            <a:ext cx="4038600" cy="3687763"/>
+          </a:xfrm>
+        </p:spPr>
+        <p:txBody>
+          <a:bodyPr/>
+          <a:lstStyle/>
+          <a:p>
+            <a:pPr lvl="1"/>
+            <a:endParaRPr lang="de-DE" dirty="0" smtClean="0"/>
+          </a:p>
+        </p:txBody>
+      </p:sp>
+      <p:sp>
+        <p:nvSpPr>
+          <p:cNvPr id="6" name="Inhaltsplatzhalter 5"/>
+          <p:cNvSpPr>
+            <a:spLocks noGrp="1"/>
+          </p:cNvSpPr>
+          <p:nvPr>
+            <p:ph sz="half" idx="2"/>
+          </p:nvPr>
+        </p:nvSpPr>
+        <p:spPr>
+          <a:xfrm>
+            <a:off x="4648200" y="2438400"/>
+            <a:ext cx="4038600" cy="3687763"/>
+          </a:xfrm>
+        </p:spPr>
+        <p:txBody>
+          <a:bodyPr/>
+          <a:lstStyle/>
+          <a:p>
+            <a:endParaRPr lang="de-DE" dirty="0"/>
+          </a:p>
+        </p:txBody>
+      </p:sp>
+    </p:spTree>
+    <p:extLst>
+      <p:ext uri="{BB962C8B-B14F-4D97-AF65-F5344CB8AC3E}">
+        <p14:creationId xmlns:p14="http://schemas.microsoft.com/office/powerpoint/2010/main" val="3784410897"/>
+      </p:ext>
+    </p:extLst>
+  </p:cSld>
+  <p:clrMapOvr>
+    <a:masterClrMapping/>
+  </p:clrMapOvr>
+  <p:transition>
+    <p:dissolve/>
+  </p:transition>
+  <p:timing>
+    <p:tnLst>
+      <p:par>
+        <p:cTn id="1" dur="indefinite" restart="never" nodeType="tmRoot"/>
+      </p:par>
+    </p:tnLst>
+  </p:timing>
+</p:sld>
+</file>
+
+<file path=ppt/slides/slide9.xml><?xml version="1.0" encoding="utf-8"?>
+<p:sld xmlns:a="http://schemas.openxmlformats.org/drawingml/2006/main" xmlns:r="http://schemas.openxmlformats.org/officeDocument/2006/relationships" xmlns:p="http://schemas.openxmlformats.org/presentationml/2006/main">
+  <p:cSld>
+    <p:spTree>
+      <p:nvGrpSpPr>
+        <p:cNvPr id="1" name=""/>
+        <p:cNvGrpSpPr/>
+        <p:nvPr/>
+      </p:nvGrpSpPr>
+      <p:grpSpPr>
+        <a:xfrm>
+          <a:off x="0" y="0"/>
+          <a:ext cx="0" cy="0"/>
+          <a:chOff x="0" y="0"/>
+          <a:chExt cx="0" cy="0"/>
+        </a:xfrm>
+      </p:grpSpPr>
+      <p:sp>
+        <p:nvSpPr>
+          <p:cNvPr id="2" name="Titel 1"/>
+          <p:cNvSpPr>
+            <a:spLocks noGrp="1"/>
+          </p:cNvSpPr>
+          <p:nvPr>
+            <p:ph type="title"/>
+          </p:nvPr>
+        </p:nvSpPr>
+        <p:spPr>
+          <a:xfrm>
+            <a:off x="457200" y="1206243"/>
+            <a:ext cx="8229600" cy="1143000"/>
+          </a:xfrm>
+        </p:spPr>
+        <p:txBody>
+          <a:bodyPr/>
+          <a:lstStyle/>
+          <a:p>
+            <a:pPr algn="l"/>
+            <a:r>
+              <a:rPr lang="de-DE" sz="3600" dirty="0" smtClean="0"/>
+              <a:t>Der </a:t>
+            </a:r>
+            <a:r>
+              <a:rPr lang="de-DE" sz="3600" dirty="0" err="1" smtClean="0"/>
+              <a:t>Raspberry</a:t>
+            </a:r>
+            <a:r>
+              <a:rPr lang="de-DE" sz="3600" dirty="0" smtClean="0"/>
+              <a:t> Pi </a:t>
+            </a:r>
+            <a:r>
+              <a:rPr lang="de-DE" sz="3600" dirty="0" smtClean="0"/>
+              <a:t>2</a:t>
+            </a:r>
+            <a:r>
+              <a:rPr lang="de-DE" sz="3600" dirty="0"/>
+              <a:t/>
+            </a:r>
+            <a:br>
+              <a:rPr lang="de-DE" sz="3600" dirty="0"/>
+            </a:br>
+            <a:r>
+              <a:rPr lang="de-DE" sz="3200" dirty="0" err="1" smtClean="0"/>
+              <a:t>Bootscreenlogo</a:t>
+            </a:r>
+            <a:endParaRPr lang="de-DE" sz="3200" dirty="0"/>
+          </a:p>
+        </p:txBody>
+      </p:sp>
+      <p:sp>
+        <p:nvSpPr>
+          <p:cNvPr id="4" name="Inhaltsplatzhalter 3"/>
+          <p:cNvSpPr>
+            <a:spLocks noGrp="1"/>
+          </p:cNvSpPr>
+          <p:nvPr>
+            <p:ph sz="half" idx="1"/>
+          </p:nvPr>
+        </p:nvSpPr>
+        <p:spPr>
+          <a:xfrm>
+            <a:off x="457200" y="2438400"/>
+            <a:ext cx="4038600" cy="3687763"/>
+          </a:xfrm>
+        </p:spPr>
+        <p:txBody>
+          <a:bodyPr/>
+          <a:lstStyle/>
+          <a:p>
+            <a:pPr lvl="1"/>
+            <a:endParaRPr lang="de-DE" dirty="0" smtClean="0"/>
+          </a:p>
+        </p:txBody>
+      </p:sp>
+      <p:sp>
+        <p:nvSpPr>
+          <p:cNvPr id="6" name="Inhaltsplatzhalter 5"/>
+          <p:cNvSpPr>
+            <a:spLocks noGrp="1"/>
+          </p:cNvSpPr>
+          <p:nvPr>
+            <p:ph sz="half" idx="2"/>
+          </p:nvPr>
+        </p:nvSpPr>
+        <p:spPr>
+          <a:xfrm>
+            <a:off x="4648200" y="2438400"/>
+            <a:ext cx="4038600" cy="3687763"/>
+          </a:xfrm>
+        </p:spPr>
+        <p:txBody>
+          <a:bodyPr/>
+          <a:lstStyle/>
+          <a:p>
+            <a:endParaRPr lang="de-DE" dirty="0"/>
+          </a:p>
+        </p:txBody>
+      </p:sp>
+    </p:spTree>
+    <p:extLst>
+      <p:ext uri="{BB962C8B-B14F-4D97-AF65-F5344CB8AC3E}">
+        <p14:creationId xmlns:p14="http://schemas.microsoft.com/office/powerpoint/2010/main" val="264805809"/>
+      </p:ext>
+    </p:extLst>
+  </p:cSld>
+  <p:clrMapOvr>
+    <a:masterClrMapping/>
+  </p:clrMapOvr>
+  <p:transition>
+    <p:dissolve/>
+  </p:transition>
+  <p:timing>
+    <p:tnLst>
+      <p:par>
+        <p:cTn id="1" dur="indefinite" restart="never" nodeType="tmRoot"/>
+      </p:par>
+    </p:tnLst>
+  </p:timing>
 </p:sld>
 </file>
 
@@ -4556,7 +5833,7 @@
         <a:effectLst/>
         <a:extLst>
           <a:ext uri="{AF507438-7753-43e0-B8FC-AC1667EBCBE1}">
-            <a14:hiddenEffects xmlns:a14="http://schemas.microsoft.com/office/drawing/2010/main" xmlns="">
+            <a14:hiddenEffects xmlns="" xmlns:a14="http://schemas.microsoft.com/office/drawing/2010/main">
               <a:effectLst>
                 <a:outerShdw blurRad="63500" dist="38099" dir="2700000" algn="ctr" rotWithShape="0">
                   <a:schemeClr val="bg2">
@@ -4633,7 +5910,7 @@
         <a:effectLst/>
         <a:extLst>
           <a:ext uri="{AF507438-7753-43e0-B8FC-AC1667EBCBE1}">
-            <a14:hiddenEffects xmlns:a14="http://schemas.microsoft.com/office/drawing/2010/main" xmlns="">
+            <a14:hiddenEffects xmlns="" xmlns:a14="http://schemas.microsoft.com/office/drawing/2010/main">
               <a:effectLst>
                 <a:outerShdw blurRad="63500" dist="38099" dir="2700000" algn="ctr" rotWithShape="0">
                   <a:schemeClr val="bg2">

</xml_diff>

<commit_message>
Presentation added the Qt Pages.
</commit_message>
<xml_diff>
--- a/documents/presentation/TallyFinal.pptx
+++ b/documents/presentation/TallyFinal.pptx
@@ -5,10 +5,10 @@
     <p:sldMasterId id="2147483648" r:id="rId1"/>
   </p:sldMasterIdLst>
   <p:notesMasterIdLst>
-    <p:notesMasterId r:id="rId16"/>
+    <p:notesMasterId r:id="rId18"/>
   </p:notesMasterIdLst>
   <p:handoutMasterIdLst>
-    <p:handoutMasterId r:id="rId17"/>
+    <p:handoutMasterId r:id="rId19"/>
   </p:handoutMasterIdLst>
   <p:sldIdLst>
     <p:sldId id="256" r:id="rId2"/>
@@ -25,6 +25,8 @@
     <p:sldId id="266" r:id="rId13"/>
     <p:sldId id="269" r:id="rId14"/>
     <p:sldId id="270" r:id="rId15"/>
+    <p:sldId id="271" r:id="rId16"/>
+    <p:sldId id="272" r:id="rId17"/>
   </p:sldIdLst>
   <p:sldSz cx="9144000" cy="6858000" type="screen4x3"/>
   <p:notesSz cx="6858000" cy="9144000"/>
@@ -221,14 +223,14 @@
           </a:ln>
           <a:extLst>
             <a:ext uri="{909E8E84-426E-40dd-AFC4-6F175D3DCCD1}">
-              <a14:hiddenFill xmlns:a14="http://schemas.microsoft.com/office/drawing/2010/main" xmlns="">
+              <a14:hiddenFill xmlns="" xmlns:a14="http://schemas.microsoft.com/office/drawing/2010/main">
                 <a:solidFill>
                   <a:schemeClr val="accent1"/>
                 </a:solidFill>
               </a14:hiddenFill>
             </a:ext>
             <a:ext uri="{91240B29-F687-4f45-9708-019B960494DF}">
-              <a14:hiddenLine xmlns:a14="http://schemas.microsoft.com/office/drawing/2010/main" xmlns="" w="9525">
+              <a14:hiddenLine xmlns="" xmlns:a14="http://schemas.microsoft.com/office/drawing/2010/main" w="9525">
                 <a:solidFill>
                   <a:schemeClr val="tx1"/>
                 </a:solidFill>
@@ -238,7 +240,7 @@
               </a14:hiddenLine>
             </a:ext>
             <a:ext uri="{FAA26D3D-D897-4be2-8F04-BA451C77F1D7}">
-              <ma14:placeholderFlag xmlns:ma14="http://schemas.microsoft.com/office/mac/drawingml/2011/main" xmlns="" val="1"/>
+              <ma14:placeholderFlag xmlns="" xmlns:ma14="http://schemas.microsoft.com/office/mac/drawingml/2011/main" val="1"/>
             </a:ext>
           </a:extLst>
         </p:spPr>
@@ -282,14 +284,14 @@
           </a:ln>
           <a:extLst>
             <a:ext uri="{909E8E84-426E-40dd-AFC4-6F175D3DCCD1}">
-              <a14:hiddenFill xmlns:a14="http://schemas.microsoft.com/office/drawing/2010/main" xmlns="">
+              <a14:hiddenFill xmlns="" xmlns:a14="http://schemas.microsoft.com/office/drawing/2010/main">
                 <a:solidFill>
                   <a:schemeClr val="accent1"/>
                 </a:solidFill>
               </a14:hiddenFill>
             </a:ext>
             <a:ext uri="{91240B29-F687-4f45-9708-019B960494DF}">
-              <a14:hiddenLine xmlns:a14="http://schemas.microsoft.com/office/drawing/2010/main" xmlns="" w="9525">
+              <a14:hiddenLine xmlns="" xmlns:a14="http://schemas.microsoft.com/office/drawing/2010/main" w="9525">
                 <a:solidFill>
                   <a:schemeClr val="tx1"/>
                 </a:solidFill>
@@ -299,7 +301,7 @@
               </a14:hiddenLine>
             </a:ext>
             <a:ext uri="{FAA26D3D-D897-4be2-8F04-BA451C77F1D7}">
-              <ma14:placeholderFlag xmlns:ma14="http://schemas.microsoft.com/office/mac/drawingml/2011/main" xmlns="" val="1"/>
+              <ma14:placeholderFlag xmlns="" xmlns:ma14="http://schemas.microsoft.com/office/mac/drawingml/2011/main" val="1"/>
             </a:ext>
           </a:extLst>
         </p:spPr>
@@ -343,14 +345,14 @@
           </a:ln>
           <a:extLst>
             <a:ext uri="{909E8E84-426E-40dd-AFC4-6F175D3DCCD1}">
-              <a14:hiddenFill xmlns:a14="http://schemas.microsoft.com/office/drawing/2010/main" xmlns="">
+              <a14:hiddenFill xmlns="" xmlns:a14="http://schemas.microsoft.com/office/drawing/2010/main">
                 <a:solidFill>
                   <a:schemeClr val="accent1"/>
                 </a:solidFill>
               </a14:hiddenFill>
             </a:ext>
             <a:ext uri="{91240B29-F687-4f45-9708-019B960494DF}">
-              <a14:hiddenLine xmlns:a14="http://schemas.microsoft.com/office/drawing/2010/main" xmlns="" w="9525">
+              <a14:hiddenLine xmlns="" xmlns:a14="http://schemas.microsoft.com/office/drawing/2010/main" w="9525">
                 <a:solidFill>
                   <a:schemeClr val="tx1"/>
                 </a:solidFill>
@@ -360,7 +362,7 @@
               </a14:hiddenLine>
             </a:ext>
             <a:ext uri="{FAA26D3D-D897-4be2-8F04-BA451C77F1D7}">
-              <ma14:placeholderFlag xmlns:ma14="http://schemas.microsoft.com/office/mac/drawingml/2011/main" xmlns="" val="1"/>
+              <ma14:placeholderFlag xmlns="" xmlns:ma14="http://schemas.microsoft.com/office/mac/drawingml/2011/main" val="1"/>
             </a:ext>
           </a:extLst>
         </p:spPr>
@@ -404,14 +406,14 @@
           </a:ln>
           <a:extLst>
             <a:ext uri="{909E8E84-426E-40dd-AFC4-6F175D3DCCD1}">
-              <a14:hiddenFill xmlns:a14="http://schemas.microsoft.com/office/drawing/2010/main" xmlns="">
+              <a14:hiddenFill xmlns="" xmlns:a14="http://schemas.microsoft.com/office/drawing/2010/main">
                 <a:solidFill>
                   <a:schemeClr val="accent1"/>
                 </a:solidFill>
               </a14:hiddenFill>
             </a:ext>
             <a:ext uri="{91240B29-F687-4f45-9708-019B960494DF}">
-              <a14:hiddenLine xmlns:a14="http://schemas.microsoft.com/office/drawing/2010/main" xmlns="" w="9525">
+              <a14:hiddenLine xmlns="" xmlns:a14="http://schemas.microsoft.com/office/drawing/2010/main" w="9525">
                 <a:solidFill>
                   <a:schemeClr val="tx1"/>
                 </a:solidFill>
@@ -421,7 +423,7 @@
               </a14:hiddenLine>
             </a:ext>
             <a:ext uri="{FAA26D3D-D897-4be2-8F04-BA451C77F1D7}">
-              <ma14:placeholderFlag xmlns:ma14="http://schemas.microsoft.com/office/mac/drawingml/2011/main" xmlns="" val="1"/>
+              <ma14:placeholderFlag xmlns="" xmlns:ma14="http://schemas.microsoft.com/office/mac/drawingml/2011/main" val="1"/>
             </a:ext>
           </a:extLst>
         </p:spPr>
@@ -506,14 +508,14 @@
           </a:ln>
           <a:extLst>
             <a:ext uri="{909E8E84-426E-40dd-AFC4-6F175D3DCCD1}">
-              <a14:hiddenFill xmlns:a14="http://schemas.microsoft.com/office/drawing/2010/main" xmlns="">
+              <a14:hiddenFill xmlns="" xmlns:a14="http://schemas.microsoft.com/office/drawing/2010/main">
                 <a:solidFill>
                   <a:schemeClr val="accent1"/>
                 </a:solidFill>
               </a14:hiddenFill>
             </a:ext>
             <a:ext uri="{91240B29-F687-4f45-9708-019B960494DF}">
-              <a14:hiddenLine xmlns:a14="http://schemas.microsoft.com/office/drawing/2010/main" xmlns="" w="9525">
+              <a14:hiddenLine xmlns="" xmlns:a14="http://schemas.microsoft.com/office/drawing/2010/main" w="9525">
                 <a:solidFill>
                   <a:schemeClr val="tx1"/>
                 </a:solidFill>
@@ -523,7 +525,7 @@
               </a14:hiddenLine>
             </a:ext>
             <a:ext uri="{FAA26D3D-D897-4be2-8F04-BA451C77F1D7}">
-              <ma14:placeholderFlag xmlns:ma14="http://schemas.microsoft.com/office/mac/drawingml/2011/main" xmlns="" val="1"/>
+              <ma14:placeholderFlag xmlns="" xmlns:ma14="http://schemas.microsoft.com/office/mac/drawingml/2011/main" val="1"/>
             </a:ext>
           </a:extLst>
         </p:spPr>
@@ -567,14 +569,14 @@
           </a:ln>
           <a:extLst>
             <a:ext uri="{909E8E84-426E-40dd-AFC4-6F175D3DCCD1}">
-              <a14:hiddenFill xmlns:a14="http://schemas.microsoft.com/office/drawing/2010/main" xmlns="">
+              <a14:hiddenFill xmlns="" xmlns:a14="http://schemas.microsoft.com/office/drawing/2010/main">
                 <a:solidFill>
                   <a:schemeClr val="accent1"/>
                 </a:solidFill>
               </a14:hiddenFill>
             </a:ext>
             <a:ext uri="{91240B29-F687-4f45-9708-019B960494DF}">
-              <a14:hiddenLine xmlns:a14="http://schemas.microsoft.com/office/drawing/2010/main" xmlns="" w="9525">
+              <a14:hiddenLine xmlns="" xmlns:a14="http://schemas.microsoft.com/office/drawing/2010/main" w="9525">
                 <a:solidFill>
                   <a:schemeClr val="tx1"/>
                 </a:solidFill>
@@ -584,7 +586,7 @@
               </a14:hiddenLine>
             </a:ext>
             <a:ext uri="{FAA26D3D-D897-4be2-8F04-BA451C77F1D7}">
-              <ma14:placeholderFlag xmlns:ma14="http://schemas.microsoft.com/office/mac/drawingml/2011/main" xmlns="" val="1"/>
+              <ma14:placeholderFlag xmlns="" xmlns:ma14="http://schemas.microsoft.com/office/mac/drawingml/2011/main" val="1"/>
             </a:ext>
           </a:extLst>
         </p:spPr>
@@ -634,7 +636,7 @@
           <a:effectLst/>
           <a:extLst>
             <a:ext uri="{AF507438-7753-43e0-B8FC-AC1667EBCBE1}">
-              <a14:hiddenEffects xmlns:a14="http://schemas.microsoft.com/office/drawing/2010/main" xmlns="">
+              <a14:hiddenEffects xmlns="" xmlns:a14="http://schemas.microsoft.com/office/drawing/2010/main">
                 <a:effectLst>
                   <a:outerShdw blurRad="63500" dist="38099" dir="2700000" algn="ctr" rotWithShape="0">
                     <a:srgbClr val="000000">
@@ -645,7 +647,7 @@
               </a14:hiddenEffects>
             </a:ext>
             <a:ext uri="{53640926-AAD7-44d8-BBD7-CCE9431645EC}">
-              <a14:shadowObscured xmlns:a14="http://schemas.microsoft.com/office/drawing/2010/main" xmlns="" val="1"/>
+              <a14:shadowObscured xmlns="" xmlns:a14="http://schemas.microsoft.com/office/drawing/2010/main" val="1"/>
             </a:ext>
           </a:extLst>
         </p:spPr>
@@ -674,14 +676,14 @@
           </a:ln>
           <a:extLst>
             <a:ext uri="{909E8E84-426E-40dd-AFC4-6F175D3DCCD1}">
-              <a14:hiddenFill xmlns:a14="http://schemas.microsoft.com/office/drawing/2010/main" xmlns="">
+              <a14:hiddenFill xmlns="" xmlns:a14="http://schemas.microsoft.com/office/drawing/2010/main">
                 <a:solidFill>
                   <a:schemeClr val="accent1"/>
                 </a:solidFill>
               </a14:hiddenFill>
             </a:ext>
             <a:ext uri="{91240B29-F687-4f45-9708-019B960494DF}">
-              <a14:hiddenLine xmlns:a14="http://schemas.microsoft.com/office/drawing/2010/main" xmlns="" w="9525">
+              <a14:hiddenLine xmlns="" xmlns:a14="http://schemas.microsoft.com/office/drawing/2010/main" w="9525">
                 <a:solidFill>
                   <a:schemeClr val="tx1"/>
                 </a:solidFill>
@@ -691,7 +693,7 @@
               </a14:hiddenLine>
             </a:ext>
             <a:ext uri="{FAA26D3D-D897-4be2-8F04-BA451C77F1D7}">
-              <ma14:placeholderFlag xmlns:ma14="http://schemas.microsoft.com/office/mac/drawingml/2011/main" xmlns="" val="1"/>
+              <ma14:placeholderFlag xmlns="" xmlns:ma14="http://schemas.microsoft.com/office/mac/drawingml/2011/main" val="1"/>
             </a:ext>
           </a:extLst>
         </p:spPr>
@@ -763,14 +765,14 @@
           </a:ln>
           <a:extLst>
             <a:ext uri="{909E8E84-426E-40dd-AFC4-6F175D3DCCD1}">
-              <a14:hiddenFill xmlns:a14="http://schemas.microsoft.com/office/drawing/2010/main" xmlns="">
+              <a14:hiddenFill xmlns="" xmlns:a14="http://schemas.microsoft.com/office/drawing/2010/main">
                 <a:solidFill>
                   <a:schemeClr val="accent1"/>
                 </a:solidFill>
               </a14:hiddenFill>
             </a:ext>
             <a:ext uri="{91240B29-F687-4f45-9708-019B960494DF}">
-              <a14:hiddenLine xmlns:a14="http://schemas.microsoft.com/office/drawing/2010/main" xmlns="" w="9525">
+              <a14:hiddenLine xmlns="" xmlns:a14="http://schemas.microsoft.com/office/drawing/2010/main" w="9525">
                 <a:solidFill>
                   <a:schemeClr val="tx1"/>
                 </a:solidFill>
@@ -780,7 +782,7 @@
               </a14:hiddenLine>
             </a:ext>
             <a:ext uri="{FAA26D3D-D897-4be2-8F04-BA451C77F1D7}">
-              <ma14:placeholderFlag xmlns:ma14="http://schemas.microsoft.com/office/mac/drawingml/2011/main" xmlns="" val="1"/>
+              <ma14:placeholderFlag xmlns="" xmlns:ma14="http://schemas.microsoft.com/office/mac/drawingml/2011/main" val="1"/>
             </a:ext>
           </a:extLst>
         </p:spPr>
@@ -824,14 +826,14 @@
           </a:ln>
           <a:extLst>
             <a:ext uri="{909E8E84-426E-40dd-AFC4-6F175D3DCCD1}">
-              <a14:hiddenFill xmlns:a14="http://schemas.microsoft.com/office/drawing/2010/main" xmlns="">
+              <a14:hiddenFill xmlns="" xmlns:a14="http://schemas.microsoft.com/office/drawing/2010/main">
                 <a:solidFill>
                   <a:schemeClr val="accent1"/>
                 </a:solidFill>
               </a14:hiddenFill>
             </a:ext>
             <a:ext uri="{91240B29-F687-4f45-9708-019B960494DF}">
-              <a14:hiddenLine xmlns:a14="http://schemas.microsoft.com/office/drawing/2010/main" xmlns="" w="9525">
+              <a14:hiddenLine xmlns="" xmlns:a14="http://schemas.microsoft.com/office/drawing/2010/main" w="9525">
                 <a:solidFill>
                   <a:schemeClr val="tx1"/>
                 </a:solidFill>
@@ -841,7 +843,7 @@
               </a14:hiddenLine>
             </a:ext>
             <a:ext uri="{FAA26D3D-D897-4be2-8F04-BA451C77F1D7}">
-              <ma14:placeholderFlag xmlns:ma14="http://schemas.microsoft.com/office/mac/drawingml/2011/main" xmlns="" val="1"/>
+              <ma14:placeholderFlag xmlns="" xmlns:ma14="http://schemas.microsoft.com/office/mac/drawingml/2011/main" val="1"/>
             </a:ext>
           </a:extLst>
         </p:spPr>
@@ -1056,7 +1058,7 @@
           <a:ln/>
           <a:extLst>
             <a:ext uri="{FAA26D3D-D897-4be2-8F04-BA451C77F1D7}">
-              <ma14:placeholderFlag xmlns:ma14="http://schemas.microsoft.com/office/mac/drawingml/2011/main" xmlns="" val="1"/>
+              <ma14:placeholderFlag xmlns="" xmlns:ma14="http://schemas.microsoft.com/office/mac/drawingml/2011/main" val="1"/>
             </a:ext>
           </a:extLst>
         </p:spPr>
@@ -1150,7 +1152,7 @@
           <a:ln/>
           <a:extLst>
             <a:ext uri="{FAA26D3D-D897-4be2-8F04-BA451C77F1D7}">
-              <ma14:placeholderFlag xmlns:ma14="http://schemas.microsoft.com/office/mac/drawingml/2011/main" xmlns="" val="1"/>
+              <ma14:placeholderFlag xmlns="" xmlns:ma14="http://schemas.microsoft.com/office/mac/drawingml/2011/main" val="1"/>
             </a:ext>
           </a:extLst>
         </p:spPr>
@@ -1244,7 +1246,7 @@
           <a:ln/>
           <a:extLst>
             <a:ext uri="{FAA26D3D-D897-4be2-8F04-BA451C77F1D7}">
-              <ma14:placeholderFlag xmlns:ma14="http://schemas.microsoft.com/office/mac/drawingml/2011/main" xmlns="" val="1"/>
+              <ma14:placeholderFlag xmlns="" xmlns:ma14="http://schemas.microsoft.com/office/mac/drawingml/2011/main" val="1"/>
             </a:ext>
           </a:extLst>
         </p:spPr>
@@ -1323,7 +1325,7 @@
           <a:effectLst/>
           <a:extLst>
             <a:ext uri="{91240B29-F687-4f45-9708-019B960494DF}">
-              <a14:hiddenLine xmlns:a14="http://schemas.microsoft.com/office/drawing/2010/main" xmlns="" w="9525">
+              <a14:hiddenLine xmlns="" xmlns:a14="http://schemas.microsoft.com/office/drawing/2010/main" w="9525">
                 <a:solidFill>
                   <a:srgbClr val="0E1B44"/>
                 </a:solidFill>
@@ -1333,7 +1335,7 @@
               </a14:hiddenLine>
             </a:ext>
             <a:ext uri="{AF507438-7753-43e0-B8FC-AC1667EBCBE1}">
-              <a14:hiddenEffects xmlns:a14="http://schemas.microsoft.com/office/drawing/2010/main" xmlns="">
+              <a14:hiddenEffects xmlns="" xmlns:a14="http://schemas.microsoft.com/office/drawing/2010/main">
                 <a:effectLst>
                   <a:outerShdw blurRad="63500" dist="38099" dir="2700000" algn="ctr" rotWithShape="0">
                     <a:srgbClr val="000000">
@@ -1377,7 +1379,7 @@
           </a:ln>
           <a:extLst>
             <a:ext uri="{91240B29-F687-4f45-9708-019B960494DF}">
-              <a14:hiddenLine xmlns:a14="http://schemas.microsoft.com/office/drawing/2010/main" xmlns="" w="9525">
+              <a14:hiddenLine xmlns="" xmlns:a14="http://schemas.microsoft.com/office/drawing/2010/main" w="9525">
                 <a:solidFill>
                   <a:schemeClr val="tx1"/>
                 </a:solidFill>
@@ -1428,7 +1430,7 @@
           <a:noFill/>
           <a:extLst>
             <a:ext uri="{909E8E84-426E-40dd-AFC4-6F175D3DCCD1}">
-              <a14:hiddenFill xmlns:a14="http://schemas.microsoft.com/office/drawing/2010/main" xmlns="">
+              <a14:hiddenFill xmlns="" xmlns:a14="http://schemas.microsoft.com/office/drawing/2010/main">
                 <a:solidFill>
                   <a:srgbClr val="FFFFFF"/>
                 </a:solidFill>
@@ -1464,7 +1466,7 @@
           </a:ln>
           <a:extLst>
             <a:ext uri="{909E8E84-426E-40dd-AFC4-6F175D3DCCD1}">
-              <a14:hiddenFill xmlns:a14="http://schemas.microsoft.com/office/drawing/2010/main" xmlns="">
+              <a14:hiddenFill xmlns="" xmlns:a14="http://schemas.microsoft.com/office/drawing/2010/main">
                 <a:noFill/>
               </a14:hiddenFill>
             </a:ext>
@@ -3188,7 +3190,7 @@
           <a:effectLst/>
           <a:extLst>
             <a:ext uri="{91240B29-F687-4f45-9708-019B960494DF}">
-              <a14:hiddenLine xmlns:a14="http://schemas.microsoft.com/office/drawing/2010/main" xmlns="" w="9525">
+              <a14:hiddenLine xmlns="" xmlns:a14="http://schemas.microsoft.com/office/drawing/2010/main" w="9525">
                 <a:solidFill>
                   <a:srgbClr val="0E1B44"/>
                 </a:solidFill>
@@ -3198,7 +3200,7 @@
               </a14:hiddenLine>
             </a:ext>
             <a:ext uri="{AF507438-7753-43e0-B8FC-AC1667EBCBE1}">
-              <a14:hiddenEffects xmlns:a14="http://schemas.microsoft.com/office/drawing/2010/main" xmlns="">
+              <a14:hiddenEffects xmlns="" xmlns:a14="http://schemas.microsoft.com/office/drawing/2010/main">
                 <a:effectLst>
                   <a:outerShdw blurRad="63500" dist="38099" dir="2700000" algn="ctr" rotWithShape="0">
                     <a:srgbClr val="000000">
@@ -3242,7 +3244,7 @@
           </a:ln>
           <a:extLst>
             <a:ext uri="{91240B29-F687-4f45-9708-019B960494DF}">
-              <a14:hiddenLine xmlns:a14="http://schemas.microsoft.com/office/drawing/2010/main" xmlns="" w="9525">
+              <a14:hiddenLine xmlns="" xmlns:a14="http://schemas.microsoft.com/office/drawing/2010/main" w="9525">
                 <a:solidFill>
                   <a:schemeClr val="tx1"/>
                 </a:solidFill>
@@ -3293,7 +3295,7 @@
           <a:noFill/>
           <a:extLst>
             <a:ext uri="{909E8E84-426E-40dd-AFC4-6F175D3DCCD1}">
-              <a14:hiddenFill xmlns:a14="http://schemas.microsoft.com/office/drawing/2010/main" xmlns="">
+              <a14:hiddenFill xmlns="" xmlns:a14="http://schemas.microsoft.com/office/drawing/2010/main">
                 <a:solidFill>
                   <a:srgbClr val="FFFFFF"/>
                 </a:solidFill>
@@ -3329,7 +3331,7 @@
           </a:ln>
           <a:extLst>
             <a:ext uri="{909E8E84-426E-40dd-AFC4-6F175D3DCCD1}">
-              <a14:hiddenFill xmlns:a14="http://schemas.microsoft.com/office/drawing/2010/main" xmlns="">
+              <a14:hiddenFill xmlns="" xmlns:a14="http://schemas.microsoft.com/office/drawing/2010/main">
                 <a:noFill/>
               </a14:hiddenFill>
             </a:ext>
@@ -3794,14 +3796,14 @@
           </a:ln>
           <a:extLst>
             <a:ext uri="{909E8E84-426E-40dd-AFC4-6F175D3DCCD1}">
-              <a14:hiddenFill xmlns:a14="http://schemas.microsoft.com/office/drawing/2010/main" xmlns="">
+              <a14:hiddenFill xmlns="" xmlns:a14="http://schemas.microsoft.com/office/drawing/2010/main">
                 <a:solidFill>
                   <a:schemeClr val="accent1"/>
                 </a:solidFill>
               </a14:hiddenFill>
             </a:ext>
             <a:ext uri="{91240B29-F687-4f45-9708-019B960494DF}">
-              <a14:hiddenLine xmlns:a14="http://schemas.microsoft.com/office/drawing/2010/main" xmlns="" w="9525">
+              <a14:hiddenLine xmlns="" xmlns:a14="http://schemas.microsoft.com/office/drawing/2010/main" w="9525">
                 <a:solidFill>
                   <a:schemeClr val="tx1"/>
                 </a:solidFill>
@@ -3845,14 +3847,14 @@
           <a:effectLst/>
           <a:extLst>
             <a:ext uri="{909E8E84-426E-40dd-AFC4-6F175D3DCCD1}">
-              <a14:hiddenFill xmlns:a14="http://schemas.microsoft.com/office/drawing/2010/main" xmlns="">
+              <a14:hiddenFill xmlns="" xmlns:a14="http://schemas.microsoft.com/office/drawing/2010/main">
                 <a:solidFill>
                   <a:schemeClr val="accent1"/>
                 </a:solidFill>
               </a14:hiddenFill>
             </a:ext>
             <a:ext uri="{91240B29-F687-4f45-9708-019B960494DF}">
-              <a14:hiddenLine xmlns:a14="http://schemas.microsoft.com/office/drawing/2010/main" xmlns="" w="9525">
+              <a14:hiddenLine xmlns="" xmlns:a14="http://schemas.microsoft.com/office/drawing/2010/main" w="9525">
                 <a:solidFill>
                   <a:schemeClr val="tx1"/>
                 </a:solidFill>
@@ -3862,7 +3864,7 @@
               </a14:hiddenLine>
             </a:ext>
             <a:ext uri="{AF507438-7753-43e0-B8FC-AC1667EBCBE1}">
-              <a14:hiddenEffects xmlns:a14="http://schemas.microsoft.com/office/drawing/2010/main" xmlns="">
+              <a14:hiddenEffects xmlns="" xmlns:a14="http://schemas.microsoft.com/office/drawing/2010/main">
                 <a:effectLst>
                   <a:outerShdw blurRad="63500" dist="38099" dir="2700000" algn="ctr" rotWithShape="0">
                     <a:schemeClr val="bg2">
@@ -3936,14 +3938,14 @@
           <a:effectLst/>
           <a:extLst>
             <a:ext uri="{909E8E84-426E-40dd-AFC4-6F175D3DCCD1}">
-              <a14:hiddenFill xmlns:a14="http://schemas.microsoft.com/office/drawing/2010/main" xmlns="">
+              <a14:hiddenFill xmlns="" xmlns:a14="http://schemas.microsoft.com/office/drawing/2010/main">
                 <a:solidFill>
                   <a:schemeClr val="accent1"/>
                 </a:solidFill>
               </a14:hiddenFill>
             </a:ext>
             <a:ext uri="{91240B29-F687-4f45-9708-019B960494DF}">
-              <a14:hiddenLine xmlns:a14="http://schemas.microsoft.com/office/drawing/2010/main" xmlns="" w="9525">
+              <a14:hiddenLine xmlns="" xmlns:a14="http://schemas.microsoft.com/office/drawing/2010/main" w="9525">
                 <a:solidFill>
                   <a:schemeClr val="tx1"/>
                 </a:solidFill>
@@ -3953,7 +3955,7 @@
               </a14:hiddenLine>
             </a:ext>
             <a:ext uri="{AF507438-7753-43e0-B8FC-AC1667EBCBE1}">
-              <a14:hiddenEffects xmlns:a14="http://schemas.microsoft.com/office/drawing/2010/main" xmlns="">
+              <a14:hiddenEffects xmlns="" xmlns:a14="http://schemas.microsoft.com/office/drawing/2010/main">
                 <a:effectLst>
                   <a:outerShdw blurRad="63500" dist="38099" dir="2700000" algn="ctr" rotWithShape="0">
                     <a:schemeClr val="bg2">
@@ -4011,14 +4013,14 @@
           </a:ln>
           <a:extLst>
             <a:ext uri="{909E8E84-426E-40dd-AFC4-6F175D3DCCD1}">
-              <a14:hiddenFill xmlns:a14="http://schemas.microsoft.com/office/drawing/2010/main" xmlns="">
+              <a14:hiddenFill xmlns="" xmlns:a14="http://schemas.microsoft.com/office/drawing/2010/main">
                 <a:solidFill>
                   <a:schemeClr val="accent1"/>
                 </a:solidFill>
               </a14:hiddenFill>
             </a:ext>
             <a:ext uri="{91240B29-F687-4f45-9708-019B960494DF}">
-              <a14:hiddenLine xmlns:a14="http://schemas.microsoft.com/office/drawing/2010/main" xmlns="" w="9525">
+              <a14:hiddenLine xmlns="" xmlns:a14="http://schemas.microsoft.com/office/drawing/2010/main" w="9525">
                 <a:solidFill>
                   <a:schemeClr val="tx1"/>
                 </a:solidFill>
@@ -4632,7 +4634,6 @@
               <a:rPr lang="de-DE" dirty="0" smtClean="0"/>
               <a:t>Nur geeignet für nicht GUI Programme</a:t>
             </a:r>
-            <a:endParaRPr lang="de-DE" dirty="0" smtClean="0"/>
           </a:p>
         </p:txBody>
       </p:sp>
@@ -5011,14 +5012,14 @@
           <a:effectLst/>
           <a:extLst>
             <a:ext uri="{909E8E84-426E-40dd-AFC4-6F175D3DCCD1}">
-              <a14:hiddenFill xmlns:a14="http://schemas.microsoft.com/office/drawing/2010/main" xmlns="">
+              <a14:hiddenFill xmlns="" xmlns:a14="http://schemas.microsoft.com/office/drawing/2010/main">
                 <a:solidFill>
                   <a:schemeClr val="accent1"/>
                 </a:solidFill>
               </a14:hiddenFill>
             </a:ext>
             <a:ext uri="{91240B29-F687-4f45-9708-019B960494DF}">
-              <a14:hiddenLine xmlns:a14="http://schemas.microsoft.com/office/drawing/2010/main" xmlns="" w="9525">
+              <a14:hiddenLine xmlns="" xmlns:a14="http://schemas.microsoft.com/office/drawing/2010/main" w="9525">
                 <a:solidFill>
                   <a:schemeClr val="tx1"/>
                 </a:solidFill>
@@ -5028,7 +5029,7 @@
               </a14:hiddenLine>
             </a:ext>
             <a:ext uri="{AF507438-7753-43e0-B8FC-AC1667EBCBE1}">
-              <a14:hiddenEffects xmlns:a14="http://schemas.microsoft.com/office/drawing/2010/main" xmlns="">
+              <a14:hiddenEffects xmlns="" xmlns:a14="http://schemas.microsoft.com/office/drawing/2010/main">
                 <a:effectLst>
                   <a:outerShdw blurRad="63500" dist="38099" dir="2700000" algn="ctr" rotWithShape="0">
                     <a:schemeClr val="bg2">
@@ -5080,14 +5081,14 @@
           <a:effectLst/>
           <a:extLst>
             <a:ext uri="{909E8E84-426E-40dd-AFC4-6F175D3DCCD1}">
-              <a14:hiddenFill xmlns:a14="http://schemas.microsoft.com/office/drawing/2010/main" xmlns="">
+              <a14:hiddenFill xmlns="" xmlns:a14="http://schemas.microsoft.com/office/drawing/2010/main">
                 <a:solidFill>
                   <a:schemeClr val="accent1"/>
                 </a:solidFill>
               </a14:hiddenFill>
             </a:ext>
             <a:ext uri="{91240B29-F687-4f45-9708-019B960494DF}">
-              <a14:hiddenLine xmlns:a14="http://schemas.microsoft.com/office/drawing/2010/main" xmlns="" w="9525">
+              <a14:hiddenLine xmlns="" xmlns:a14="http://schemas.microsoft.com/office/drawing/2010/main" w="9525">
                 <a:solidFill>
                   <a:schemeClr val="tx1"/>
                 </a:solidFill>
@@ -5097,7 +5098,7 @@
               </a14:hiddenLine>
             </a:ext>
             <a:ext uri="{AF507438-7753-43e0-B8FC-AC1667EBCBE1}">
-              <a14:hiddenEffects xmlns:a14="http://schemas.microsoft.com/office/drawing/2010/main" xmlns="">
+              <a14:hiddenEffects xmlns="" xmlns:a14="http://schemas.microsoft.com/office/drawing/2010/main">
                 <a:effectLst>
                   <a:outerShdw blurRad="63500" dist="38099" dir="2700000" algn="ctr" rotWithShape="0">
                     <a:schemeClr val="bg2">
@@ -5184,6 +5185,269 @@
       </p:par>
     </p:tnLst>
   </p:timing>
+</p:sld>
+</file>
+
+<file path=ppt/slides/slide15.xml><?xml version="1.0" encoding="utf-8"?>
+<p:sld xmlns:a="http://schemas.openxmlformats.org/drawingml/2006/main" xmlns:r="http://schemas.openxmlformats.org/officeDocument/2006/relationships" xmlns:p="http://schemas.openxmlformats.org/presentationml/2006/main">
+  <p:cSld>
+    <p:spTree>
+      <p:nvGrpSpPr>
+        <p:cNvPr id="1" name=""/>
+        <p:cNvGrpSpPr/>
+        <p:nvPr/>
+      </p:nvGrpSpPr>
+      <p:grpSpPr>
+        <a:xfrm>
+          <a:off x="0" y="0"/>
+          <a:ext cx="0" cy="0"/>
+          <a:chOff x="0" y="0"/>
+          <a:chExt cx="0" cy="0"/>
+        </a:xfrm>
+      </p:grpSpPr>
+      <p:sp>
+        <p:nvSpPr>
+          <p:cNvPr id="2" name="Titel 1"/>
+          <p:cNvSpPr>
+            <a:spLocks noGrp="1"/>
+          </p:cNvSpPr>
+          <p:nvPr>
+            <p:ph type="title"/>
+          </p:nvPr>
+        </p:nvSpPr>
+        <p:spPr>
+          <a:xfrm>
+            <a:off x="457200" y="1600200"/>
+            <a:ext cx="8229600" cy="1143000"/>
+          </a:xfrm>
+        </p:spPr>
+        <p:txBody>
+          <a:bodyPr/>
+          <a:lstStyle/>
+          <a:p>
+            <a:r>
+              <a:rPr lang="de-DE" dirty="0" err="1" smtClean="0"/>
+              <a:t>Qt</a:t>
+            </a:r>
+            <a:endParaRPr lang="de-DE" dirty="0"/>
+          </a:p>
+        </p:txBody>
+      </p:sp>
+      <p:sp>
+        <p:nvSpPr>
+          <p:cNvPr id="3" name="Inhaltsplatzhalter 2"/>
+          <p:cNvSpPr>
+            <a:spLocks noGrp="1"/>
+          </p:cNvSpPr>
+          <p:nvPr>
+            <p:ph idx="1"/>
+          </p:nvPr>
+        </p:nvSpPr>
+        <p:spPr>
+          <a:xfrm>
+            <a:off x="457200" y="2802926"/>
+            <a:ext cx="8229600" cy="3696730"/>
+          </a:xfrm>
+        </p:spPr>
+        <p:txBody>
+          <a:bodyPr/>
+          <a:lstStyle/>
+          <a:p>
+            <a:r>
+              <a:rPr lang="de-DE" dirty="0" smtClean="0"/>
+              <a:t>Klassenbibliothek in C++</a:t>
+            </a:r>
+          </a:p>
+          <a:p>
+            <a:r>
+              <a:rPr lang="de-DE" dirty="0" smtClean="0"/>
+              <a:t>Arbeiten mit Version 4.8.1</a:t>
+            </a:r>
+          </a:p>
+          <a:p>
+            <a:r>
+              <a:rPr lang="de-DE" dirty="0" smtClean="0"/>
+              <a:t>Debugger GNU </a:t>
+            </a:r>
+            <a:r>
+              <a:rPr lang="de-DE" dirty="0" err="1" smtClean="0"/>
+              <a:t>gdb</a:t>
+            </a:r>
+            <a:r>
+              <a:rPr lang="de-DE" dirty="0" smtClean="0"/>
+              <a:t> 7.8</a:t>
+            </a:r>
+          </a:p>
+          <a:p>
+            <a:r>
+              <a:rPr lang="de-DE" dirty="0"/>
+              <a:t>C</a:t>
+            </a:r>
+            <a:r>
+              <a:rPr lang="de-DE" dirty="0" smtClean="0"/>
+              <a:t>ompiler </a:t>
+            </a:r>
+            <a:r>
+              <a:rPr lang="de-DE" dirty="0" err="1" smtClean="0"/>
+              <a:t>MinGW</a:t>
+            </a:r>
+            <a:r>
+              <a:rPr lang="de-DE" dirty="0" smtClean="0"/>
+              <a:t> 4.9.1</a:t>
+            </a:r>
+          </a:p>
+          <a:p>
+            <a:r>
+              <a:rPr lang="de-DE" dirty="0" smtClean="0"/>
+              <a:t>Arbeiteten auf unseren eigenen PCs</a:t>
+            </a:r>
+            <a:endParaRPr lang="de-DE" dirty="0"/>
+          </a:p>
+        </p:txBody>
+      </p:sp>
+    </p:spTree>
+    <p:extLst>
+      <p:ext uri="{BB962C8B-B14F-4D97-AF65-F5344CB8AC3E}">
+        <p14:creationId xmlns:p14="http://schemas.microsoft.com/office/powerpoint/2010/main" val="2461881697"/>
+      </p:ext>
+    </p:extLst>
+  </p:cSld>
+  <p:clrMapOvr>
+    <a:masterClrMapping/>
+  </p:clrMapOvr>
+  <p:transition>
+    <p:dissolve/>
+  </p:transition>
+</p:sld>
+</file>
+
+<file path=ppt/slides/slide16.xml><?xml version="1.0" encoding="utf-8"?>
+<p:sld xmlns:a="http://schemas.openxmlformats.org/drawingml/2006/main" xmlns:r="http://schemas.openxmlformats.org/officeDocument/2006/relationships" xmlns:p="http://schemas.openxmlformats.org/presentationml/2006/main">
+  <p:cSld>
+    <p:spTree>
+      <p:nvGrpSpPr>
+        <p:cNvPr id="1" name=""/>
+        <p:cNvGrpSpPr/>
+        <p:nvPr/>
+      </p:nvGrpSpPr>
+      <p:grpSpPr>
+        <a:xfrm>
+          <a:off x="0" y="0"/>
+          <a:ext cx="0" cy="0"/>
+          <a:chOff x="0" y="0"/>
+          <a:chExt cx="0" cy="0"/>
+        </a:xfrm>
+      </p:grpSpPr>
+      <p:sp>
+        <p:nvSpPr>
+          <p:cNvPr id="2" name="Titel 1"/>
+          <p:cNvSpPr>
+            <a:spLocks noGrp="1"/>
+          </p:cNvSpPr>
+          <p:nvPr>
+            <p:ph type="title"/>
+          </p:nvPr>
+        </p:nvSpPr>
+        <p:spPr>
+          <a:xfrm>
+            <a:off x="457200" y="1238465"/>
+            <a:ext cx="8229600" cy="1143000"/>
+          </a:xfrm>
+        </p:spPr>
+        <p:txBody>
+          <a:bodyPr/>
+          <a:lstStyle/>
+          <a:p>
+            <a:r>
+              <a:rPr lang="de-DE" dirty="0" smtClean="0"/>
+              <a:t>Grundgerüst</a:t>
+            </a:r>
+            <a:endParaRPr lang="de-DE" dirty="0"/>
+          </a:p>
+        </p:txBody>
+      </p:sp>
+      <p:sp>
+        <p:nvSpPr>
+          <p:cNvPr id="3" name="Inhaltsplatzhalter 2"/>
+          <p:cNvSpPr>
+            <a:spLocks noGrp="1"/>
+          </p:cNvSpPr>
+          <p:nvPr>
+            <p:ph idx="1"/>
+          </p:nvPr>
+        </p:nvSpPr>
+        <p:spPr>
+          <a:xfrm>
+            <a:off x="457200" y="2621692"/>
+            <a:ext cx="8229600" cy="3910914"/>
+          </a:xfrm>
+        </p:spPr>
+        <p:txBody>
+          <a:bodyPr/>
+          <a:lstStyle/>
+          <a:p>
+            <a:r>
+              <a:rPr lang="de-DE" dirty="0" smtClean="0"/>
+              <a:t>13 Klassen und eine </a:t>
+            </a:r>
+            <a:r>
+              <a:rPr lang="de-DE" dirty="0" err="1" smtClean="0"/>
+              <a:t>main</a:t>
+            </a:r>
+            <a:endParaRPr lang="de-DE" dirty="0" smtClean="0"/>
+          </a:p>
+          <a:p>
+            <a:r>
+              <a:rPr lang="de-DE" dirty="0" smtClean="0"/>
+              <a:t>Automaten als </a:t>
+            </a:r>
+            <a:r>
+              <a:rPr lang="de-DE" dirty="0" err="1" smtClean="0"/>
+              <a:t>Hauptsruktur</a:t>
+            </a:r>
+            <a:endParaRPr lang="de-DE" dirty="0" smtClean="0"/>
+          </a:p>
+          <a:p>
+            <a:r>
+              <a:rPr lang="de-DE" dirty="0" smtClean="0"/>
+              <a:t>Hauptfenster mit </a:t>
+            </a:r>
+            <a:r>
+              <a:rPr lang="de-DE" dirty="0" err="1" smtClean="0"/>
+              <a:t>Widgets</a:t>
+            </a:r>
+            <a:endParaRPr lang="de-DE" dirty="0" smtClean="0"/>
+          </a:p>
+          <a:p>
+            <a:endParaRPr lang="de-DE" dirty="0"/>
+          </a:p>
+          <a:p>
+            <a:pPr marL="0" indent="0">
+              <a:buNone/>
+            </a:pPr>
+            <a:r>
+              <a:rPr lang="de-DE" dirty="0" smtClean="0">
+                <a:sym typeface="Wingdings" panose="05000000000000000000" pitchFamily="2" charset="2"/>
+              </a:rPr>
+              <a:t> Beispiele am Code</a:t>
+            </a:r>
+            <a:endParaRPr lang="de-DE" dirty="0"/>
+          </a:p>
+        </p:txBody>
+      </p:sp>
+    </p:spTree>
+    <p:extLst>
+      <p:ext uri="{BB962C8B-B14F-4D97-AF65-F5344CB8AC3E}">
+        <p14:creationId xmlns:p14="http://schemas.microsoft.com/office/powerpoint/2010/main" val="1052475433"/>
+      </p:ext>
+    </p:extLst>
+  </p:cSld>
+  <p:clrMapOvr>
+    <a:masterClrMapping/>
+  </p:clrMapOvr>
+  <p:transition>
+    <p:dissolve/>
+  </p:transition>
 </p:sld>
 </file>
 
@@ -5227,14 +5491,14 @@
           <a:effectLst/>
           <a:extLst>
             <a:ext uri="{909E8E84-426E-40dd-AFC4-6F175D3DCCD1}">
-              <a14:hiddenFill xmlns:a14="http://schemas.microsoft.com/office/drawing/2010/main" xmlns="">
+              <a14:hiddenFill xmlns="" xmlns:a14="http://schemas.microsoft.com/office/drawing/2010/main">
                 <a:solidFill>
                   <a:schemeClr val="accent1"/>
                 </a:solidFill>
               </a14:hiddenFill>
             </a:ext>
             <a:ext uri="{91240B29-F687-4f45-9708-019B960494DF}">
-              <a14:hiddenLine xmlns:a14="http://schemas.microsoft.com/office/drawing/2010/main" xmlns="" w="9525">
+              <a14:hiddenLine xmlns="" xmlns:a14="http://schemas.microsoft.com/office/drawing/2010/main" w="9525">
                 <a:solidFill>
                   <a:schemeClr val="tx1"/>
                 </a:solidFill>
@@ -5244,7 +5508,7 @@
               </a14:hiddenLine>
             </a:ext>
             <a:ext uri="{AF507438-7753-43e0-B8FC-AC1667EBCBE1}">
-              <a14:hiddenEffects xmlns:a14="http://schemas.microsoft.com/office/drawing/2010/main" xmlns="">
+              <a14:hiddenEffects xmlns="" xmlns:a14="http://schemas.microsoft.com/office/drawing/2010/main">
                 <a:effectLst>
                   <a:outerShdw blurRad="63500" dist="38099" dir="2700000" algn="ctr" rotWithShape="0">
                     <a:schemeClr val="bg2">
@@ -5296,14 +5560,14 @@
           <a:effectLst/>
           <a:extLst>
             <a:ext uri="{909E8E84-426E-40dd-AFC4-6F175D3DCCD1}">
-              <a14:hiddenFill xmlns:a14="http://schemas.microsoft.com/office/drawing/2010/main" xmlns="">
+              <a14:hiddenFill xmlns="" xmlns:a14="http://schemas.microsoft.com/office/drawing/2010/main">
                 <a:solidFill>
                   <a:schemeClr val="accent1"/>
                 </a:solidFill>
               </a14:hiddenFill>
             </a:ext>
             <a:ext uri="{91240B29-F687-4f45-9708-019B960494DF}">
-              <a14:hiddenLine xmlns:a14="http://schemas.microsoft.com/office/drawing/2010/main" xmlns="" w="9525">
+              <a14:hiddenLine xmlns="" xmlns:a14="http://schemas.microsoft.com/office/drawing/2010/main" w="9525">
                 <a:solidFill>
                   <a:schemeClr val="tx1"/>
                 </a:solidFill>
@@ -5313,7 +5577,7 @@
               </a14:hiddenLine>
             </a:ext>
             <a:ext uri="{AF507438-7753-43e0-B8FC-AC1667EBCBE1}">
-              <a14:hiddenEffects xmlns:a14="http://schemas.microsoft.com/office/drawing/2010/main" xmlns="">
+              <a14:hiddenEffects xmlns="" xmlns:a14="http://schemas.microsoft.com/office/drawing/2010/main">
                 <a:effectLst>
                   <a:outerShdw blurRad="63500" dist="38099" dir="2700000" algn="ctr" rotWithShape="0">
                     <a:schemeClr val="bg2">
@@ -6093,7 +6357,6 @@
               <a:rPr lang="de-DE" dirty="0" smtClean="0"/>
               <a:t>LED Hintergrundbeleuchtung</a:t>
             </a:r>
-            <a:endParaRPr lang="de-DE" dirty="0" smtClean="0"/>
           </a:p>
         </p:txBody>
       </p:sp>
@@ -6286,7 +6549,6 @@
               <a:rPr lang="de-DE" dirty="0" smtClean="0"/>
               <a:t>Passender Kernel vom Hersteller</a:t>
             </a:r>
-            <a:endParaRPr lang="de-DE" dirty="0" smtClean="0"/>
           </a:p>
         </p:txBody>
       </p:sp>
@@ -6824,7 +7086,6 @@
               <a:rPr lang="de-DE" sz="2400" dirty="0"/>
               <a:t> "WLAN-PASSWORT"</a:t>
             </a:r>
-            <a:endParaRPr lang="de-DE" sz="2400" dirty="0"/>
           </a:p>
         </p:txBody>
       </p:sp>
@@ -7097,7 +7358,7 @@
         <a:effectLst/>
         <a:extLst>
           <a:ext uri="{AF507438-7753-43e0-B8FC-AC1667EBCBE1}">
-            <a14:hiddenEffects xmlns:a14="http://schemas.microsoft.com/office/drawing/2010/main" xmlns="">
+            <a14:hiddenEffects xmlns="" xmlns:a14="http://schemas.microsoft.com/office/drawing/2010/main">
               <a:effectLst>
                 <a:outerShdw blurRad="63500" dist="38099" dir="2700000" algn="ctr" rotWithShape="0">
                   <a:schemeClr val="bg2">
@@ -7174,7 +7435,7 @@
         <a:effectLst/>
         <a:extLst>
           <a:ext uri="{AF507438-7753-43e0-B8FC-AC1667EBCBE1}">
-            <a14:hiddenEffects xmlns:a14="http://schemas.microsoft.com/office/drawing/2010/main" xmlns="">
+            <a14:hiddenEffects xmlns="" xmlns:a14="http://schemas.microsoft.com/office/drawing/2010/main">
               <a:effectLst>
                 <a:outerShdw blurRad="63500" dist="38099" dir="2700000" algn="ctr" rotWithShape="0">
                   <a:schemeClr val="bg2">

</xml_diff>